<commit_message>
Added hud image to dbhi-presentation
</commit_message>
<xml_diff>
--- a/kc-lead-impact/results/dbhi-presentation.pptx
+++ b/kc-lead-impact/results/dbhi-presentation.pptx
@@ -5,7 +5,7 @@
     <p:sldMasterId id="2147483648" r:id="rId1"/>
   </p:sldMasterIdLst>
   <p:notesMasterIdLst>
-    <p:notesMasterId r:id="rId8"/>
+    <p:notesMasterId r:id="rId16"/>
   </p:notesMasterIdLst>
   <p:sldIdLst>
     <p:sldId id="256" r:id="rId2"/>
@@ -14,6 +14,14 @@
     <p:sldId id="259" r:id="rId5"/>
     <p:sldId id="260" r:id="rId6"/>
     <p:sldId id="261" r:id="rId7"/>
+    <p:sldId id="262" r:id="rId8"/>
+    <p:sldId id="263" r:id="rId9"/>
+    <p:sldId id="264" r:id="rId10"/>
+    <p:sldId id="265" r:id="rId11"/>
+    <p:sldId id="266" r:id="rId12"/>
+    <p:sldId id="267" r:id="rId13"/>
+    <p:sldId id="268" r:id="rId14"/>
+    <p:sldId id="269" r:id="rId15"/>
   </p:sldIdLst>
   <p:sldSz cx="9144000" cy="5143500" type="screen16x9"/>
   <p:notesSz cx="6858000" cy="9144000"/>
@@ -529,21 +537,145 @@
             </a:pPr>
             <a:r>
               <a:rPr/>
-              <a:t>The work we propose takes advantage of two key resources that already exist. The first is data from the Lead Safe Kansas City project. This program, funded by HUD, tests children for lead poisoning, home testing, and remediates if lead hazards are found. There is a massive amount of information from this project, 20 years worth of data and 18 thousand health encounters per year.</a:t>
-            </a:r>
-          </a:p>
+              <a:t>Back in 2018, the new Provost, Mauli Agrawal, convened a series of meetings for a group of people interested in data science. The goal was to talk about new research and teaching activities in this area. At the end of the meeting, Doug Bowles, stopped and talked to me about possibly helping with the work at a group he was running, the Center for Economic Information.</a:t>
+            </a:r>
+          </a:p>
+        </p:txBody>
+      </p:sp>
+      <p:sp>
+        <p:nvSpPr>
+          <p:cNvPr id="4" name="Slide Number Placeholder 3"/>
+          <p:cNvSpPr>
+            <a:spLocks noGrp="1"/>
+          </p:cNvSpPr>
+          <p:nvPr>
+            <p:ph type="sldNum" sz="quarter" idx="10"/>
+          </p:nvPr>
+        </p:nvSpPr>
+        <p:spPr/>
+        <p:txBody>
+          <a:bodyPr/>
+          <a:lstStyle/>
+          <a:p>
+            <a:fld id="{18BDFEC3-8487-43E8-A154-7C12CBC1FFF2}" type="slidenum">
+              <a:rPr lang="en-US"/>
+              <a:t>2</a:t>
+            </a:fld>
+            <a:endParaRPr lang="en-US"/>
+          </a:p>
+        </p:txBody>
+      </p:sp>
+    </p:spTree>
+  </p:cSld>
+</p:notes>
+</file>
+
+<file path=ppt/notesSlides/notesSlide10.xml><?xml version="1.0" encoding="utf-8"?>
+<p:notes xmlns:a="http://schemas.openxmlformats.org/drawingml/2006/main" xmlns:r="http://schemas.openxmlformats.org/officeDocument/2006/relationships" xmlns:p="http://schemas.openxmlformats.org/presentationml/2006/main">
+  <p:cSld>
+    <p:spTree>
+      <p:nvGrpSpPr>
+        <p:cNvPr id="1" name=""/>
+        <p:cNvGrpSpPr/>
+        <p:nvPr/>
+      </p:nvGrpSpPr>
+      <p:grpSpPr>
+        <a:xfrm>
+          <a:off x="0" y="0"/>
+          <a:ext cx="0" cy="0"/>
+          <a:chOff x="0" y="0"/>
+          <a:chExt cx="0" cy="0"/>
+        </a:xfrm>
+      </p:grpSpPr>
+      <p:sp>
+        <p:nvSpPr>
+          <p:cNvPr id="2" name="Slide Image Placeholder 1"/>
+          <p:cNvSpPr>
+            <a:spLocks noGrp="1" noRot="1" noChangeAspect="1"/>
+          </p:cNvSpPr>
+          <p:nvPr>
+            <p:ph type="sldImg"/>
+          </p:nvPr>
+        </p:nvSpPr>
+        <p:spPr/>
+      </p:sp>
+      <p:sp>
+        <p:nvSpPr>
+          <p:cNvPr id="3" name="Notes Placeholder 2"/>
+          <p:cNvSpPr>
+            <a:spLocks noGrp="1"/>
+          </p:cNvSpPr>
+          <p:nvPr>
+            <p:ph type="body" idx="1"/>
+          </p:nvPr>
+        </p:nvSpPr>
+        <p:spPr/>
+        <p:txBody>
+          <a:bodyPr/>
+          <a:lstStyle/>
           <a:p>
             <a:pPr lvl="0" indent="0" marL="0">
               <a:buNone/>
             </a:pPr>
+            <a:r>
+              <a:rPr/>
+              <a:t>we’re quite proud of the proposal that we put together and see three major strengths of this research.</a:t>
+            </a:r>
           </a:p>
           <a:p>
             <a:pPr lvl="0" indent="0" marL="0">
               <a:buNone/>
             </a:pPr>
-            <a:r>
-              <a:rPr/>
-              <a:t>The second resource is an exterior based housing survey developed by the Center for Economic Information and used in many Kansas City Missouri and Kansas City Kansas neighborhoods over the past two decades. It can be conducted by graduate students after a carefully established training program. The individual items in the survey, such as roofing condition are easily observed at the street level and can be done quickly and accurately. Our team has built extensive quality control procedures into the survey. It can be done quickly and cheaply. Our team has collected data on over 260 thousand houses over a 14 year period.</a:t>
+          </a:p>
+          <a:p>
+            <a:pPr lvl="0" indent="0" marL="0">
+              <a:buNone/>
+            </a:pPr>
+            <a:r>
+              <a:rPr/>
+              <a:t>First, we are leveraging existing resources in this research. We have extensive data from the KC Lead Safe project and will use that to evaluate the long term success of lead remediation. We have an established methodology for surveying the exterior conditions of a house and expect that this will be predictive of interior conditions as well.</a:t>
+            </a:r>
+          </a:p>
+          <a:p>
+            <a:pPr lvl="0" indent="0" marL="0">
+              <a:buNone/>
+            </a:pPr>
+          </a:p>
+          <a:p>
+            <a:pPr lvl="0" indent="0" marL="0">
+              <a:buNone/>
+            </a:pPr>
+            <a:r>
+              <a:rPr/>
+              <a:t>Second, we are proposing cost effective methods for this work. The exterior conditions survey is fast, convenient, and inexpensive. We hope to show that this simple survey will allow a cost-effective approach to identify where to best spend remediation efforts.</a:t>
+            </a:r>
+          </a:p>
+          <a:p>
+            <a:pPr lvl="0" indent="0" marL="0">
+              <a:buNone/>
+            </a:pPr>
+          </a:p>
+          <a:p>
+            <a:pPr lvl="0" indent="0" marL="0">
+              <a:buNone/>
+            </a:pPr>
+            <a:r>
+              <a:rPr/>
+              <a:t>Third, we have detailed quality control procedures already in place for these procedures. There is a detailed training protocol, for example, for the exterior house conditions survey, and duplicate assessment of all survey items.</a:t>
+            </a:r>
+          </a:p>
+          <a:p>
+            <a:pPr lvl="0" indent="0" marL="0">
+              <a:buNone/>
+            </a:pPr>
+          </a:p>
+          <a:p>
+            <a:pPr lvl="0" indent="0" marL="0">
+              <a:buNone/>
+            </a:pPr>
+            <a:r>
+              <a:rPr/>
+              <a:t>Finally, if the approach we propose is proven by the research data, it would take very little effort to package up the work and apply it to other communities in the United States.</a:t>
             </a:r>
           </a:p>
         </p:txBody>
@@ -565,7 +697,7 @@
           <a:p>
             <a:fld id="{18BDFEC3-8487-43E8-A154-7C12CBC1FFF2}" type="slidenum">
               <a:rPr lang="en-US"/>
-              <a:t>3</a:t>
+              <a:t>14</a:t>
             </a:fld>
             <a:endParaRPr lang="en-US"/>
           </a:p>
@@ -625,7 +757,7 @@
             </a:pPr>
             <a:r>
               <a:rPr/>
-              <a:t>We will describe the extent to which different interventions have made housing lead safe by HUD standards and how this leads to fewer lead poisoned children among those who move into a home after remediation activity.</a:t>
+              <a:t>Here’s a map showing single family home ownership by neighborhood.</a:t>
             </a:r>
           </a:p>
         </p:txBody>
@@ -647,7 +779,7 @@
           <a:p>
             <a:fld id="{18BDFEC3-8487-43E8-A154-7C12CBC1FFF2}" type="slidenum">
               <a:rPr lang="en-US"/>
-              <a:t>4</a:t>
+              <a:t>5</a:t>
             </a:fld>
             <a:endParaRPr lang="en-US"/>
           </a:p>
@@ -707,7 +839,7 @@
             </a:pPr>
             <a:r>
               <a:rPr/>
-              <a:t>Our agenda is to develop a primary prevention technique based on exterior housing observations as well as neighborhood level social determinants of health. The goal will be to develop a data-driven, housing-based index that Lead Hazard Control programs can use to select the homes most in need of lead-based hazard remediation.</a:t>
+              <a:t>A major effort of CEI has been their development and validation of the neighborhood housing conditions survey (NHCS). This survey provides ratings for parcels: residential housing and other structures including vacant lots. The survey uses an five point ordinal rating of fifteen elements related to the quality of a housing unit. These address the structure of house itself (such as conditions of the roof, porch, and exterior paint), the grounds around the house (such as the lawn, litter, and open storage) and the infrastructure (such as the sidewalk, curbs, and street lights).</a:t>
             </a:r>
           </a:p>
         </p:txBody>
@@ -729,7 +861,7 @@
           <a:p>
             <a:fld id="{18BDFEC3-8487-43E8-A154-7C12CBC1FFF2}" type="slidenum">
               <a:rPr lang="en-US"/>
-              <a:t>5</a:t>
+              <a:t>6</a:t>
             </a:fld>
             <a:endParaRPr lang="en-US"/>
           </a:p>
@@ -789,7 +921,7 @@
             </a:pPr>
             <a:r>
               <a:rPr/>
-              <a:t>we’re quite proud of the proposal that we put together and see three major strengths of this research.</a:t>
+              <a:t>CEI researchers in teams of two. The driver went slowly down the street and the researcher riding shotgun entered data on each house along the street.</a:t>
             </a:r>
           </a:p>
           <a:p>
@@ -803,7 +935,7 @@
             </a:pPr>
             <a:r>
               <a:rPr/>
-              <a:t>First, we are leveraging existing resources in this research. We have extensive data from the KC Lead Safe project and will use that to evaluate the long term success of lead remediation. We have an established methodology for surveying the exterior conditions of a house and expect that this will be predictive of interior conditions as well.</a:t>
+              <a:t>Because this data collection involved observations in a public setting, the IRB quickly determined that this study was exempt.</a:t>
             </a:r>
           </a:p>
           <a:p>
@@ -817,7 +949,7 @@
             </a:pPr>
             <a:r>
               <a:rPr/>
-              <a:t>Second, we are proposing cost effective methods for this work. The exterior conditions survey is fast, convenient, and inexpensive. We hope to show that this simple survey will allow a cost-effective approach to identify where to best spend remediation efforts.</a:t>
+              <a:t>It is relatively inexpensive, about $6 per house, when all the costs are accounted for.</a:t>
             </a:r>
           </a:p>
           <a:p>
@@ -831,7 +963,7 @@
             </a:pPr>
             <a:r>
               <a:rPr/>
-              <a:t>Third, we have detailed quality control procedures already in place for these procedures. There is a detailed training protocol, for example, for the exterior house conditions survey, and duplicate assessment of all survey items.</a:t>
+              <a:t>The survey provided a ton of data. Over a fifteen year period, CEI collected data on over 260,000 houses.</a:t>
             </a:r>
           </a:p>
           <a:p>
@@ -845,7 +977,21 @@
             </a:pPr>
             <a:r>
               <a:rPr/>
-              <a:t>Finally, if the approach we propose is proven by the research data, it would take very little effort to package up the work and apply it to other communities in the United States.</a:t>
+              <a:t>The home in which you live affects many aspects of your social and economic well being. Can it affect your health as well. The answer is a strong YES!</a:t>
+            </a:r>
+          </a:p>
+          <a:p>
+            <a:pPr lvl="0" indent="0" marL="0">
+              <a:buNone/>
+            </a:pPr>
+          </a:p>
+          <a:p>
+            <a:pPr lvl="0" indent="0" marL="0">
+              <a:buNone/>
+            </a:pPr>
+            <a:r>
+              <a:rPr/>
+              <a:t>Much of my early work with CEI involved providing informal support to two students working at CEI. Both produced dissertations that addressed the influence of housing quality on health.</a:t>
             </a:r>
           </a:p>
         </p:txBody>
@@ -867,7 +1013,473 @@
           <a:p>
             <a:fld id="{18BDFEC3-8487-43E8-A154-7C12CBC1FFF2}" type="slidenum">
               <a:rPr lang="en-US"/>
-              <a:t>6</a:t>
+              <a:t>7</a:t>
+            </a:fld>
+            <a:endParaRPr lang="en-US"/>
+          </a:p>
+        </p:txBody>
+      </p:sp>
+    </p:spTree>
+  </p:cSld>
+</p:notes>
+</file>
+
+<file path=ppt/notesSlides/notesSlide5.xml><?xml version="1.0" encoding="utf-8"?>
+<p:notes xmlns:a="http://schemas.openxmlformats.org/drawingml/2006/main" xmlns:r="http://schemas.openxmlformats.org/officeDocument/2006/relationships" xmlns:p="http://schemas.openxmlformats.org/presentationml/2006/main">
+  <p:cSld>
+    <p:spTree>
+      <p:nvGrpSpPr>
+        <p:cNvPr id="1" name=""/>
+        <p:cNvGrpSpPr/>
+        <p:nvPr/>
+      </p:nvGrpSpPr>
+      <p:grpSpPr>
+        <a:xfrm>
+          <a:off x="0" y="0"/>
+          <a:ext cx="0" cy="0"/>
+          <a:chOff x="0" y="0"/>
+          <a:chExt cx="0" cy="0"/>
+        </a:xfrm>
+      </p:grpSpPr>
+      <p:sp>
+        <p:nvSpPr>
+          <p:cNvPr id="2" name="Slide Image Placeholder 1"/>
+          <p:cNvSpPr>
+            <a:spLocks noGrp="1" noRot="1" noChangeAspect="1"/>
+          </p:cNvSpPr>
+          <p:nvPr>
+            <p:ph type="sldImg"/>
+          </p:nvPr>
+        </p:nvSpPr>
+        <p:spPr/>
+      </p:sp>
+      <p:sp>
+        <p:nvSpPr>
+          <p:cNvPr id="3" name="Notes Placeholder 2"/>
+          <p:cNvSpPr>
+            <a:spLocks noGrp="1"/>
+          </p:cNvSpPr>
+          <p:nvPr>
+            <p:ph type="body" idx="1"/>
+          </p:nvPr>
+        </p:nvSpPr>
+        <p:spPr/>
+        <p:txBody>
+          <a:bodyPr/>
+          <a:lstStyle/>
+          <a:p>
+            <a:pPr lvl="0" indent="0" marL="0">
+              <a:buNone/>
+            </a:pPr>
+            <a:r>
+              <a:rPr/>
+              <a:t>Natalie Kane, pictured here, wrote a dissertation examining how asthma can be exacerbated by poor housing conditions and other environmental variables such as proximity to point sources of pollution.</a:t>
+            </a:r>
+          </a:p>
+          <a:p>
+            <a:pPr lvl="0" indent="0" marL="0">
+              <a:buNone/>
+            </a:pPr>
+          </a:p>
+          <a:p>
+            <a:pPr lvl="0" indent="0" marL="0">
+              <a:buNone/>
+            </a:pPr>
+            <a:r>
+              <a:rPr/>
+              <a:t>She graduated from UMKC in 2020, worked as a post-doc at Children’s Mercy under the direction of Mark Hoffman, and is now working for My Sidewalk, an organization helping communities to access data useful for planning and lobbying efforts.</a:t>
+            </a:r>
+          </a:p>
+          <a:p>
+            <a:pPr lvl="0" indent="0" marL="0">
+              <a:buNone/>
+            </a:pPr>
+          </a:p>
+          <a:p>
+            <a:pPr lvl="0" indent="0" marL="0">
+              <a:buNone/>
+            </a:pPr>
+            <a:r>
+              <a:rPr/>
+              <a:t>I offered some informal advice about some Bayesian models she was using. She actually had done everything quite well, so my job was mostly explaining how to interpret these models and how to display her results properly.</a:t>
+            </a:r>
+          </a:p>
+        </p:txBody>
+      </p:sp>
+      <p:sp>
+        <p:nvSpPr>
+          <p:cNvPr id="4" name="Slide Number Placeholder 3"/>
+          <p:cNvSpPr>
+            <a:spLocks noGrp="1"/>
+          </p:cNvSpPr>
+          <p:nvPr>
+            <p:ph type="sldNum" sz="quarter" idx="10"/>
+          </p:nvPr>
+        </p:nvSpPr>
+        <p:spPr/>
+        <p:txBody>
+          <a:bodyPr/>
+          <a:lstStyle/>
+          <a:p>
+            <a:fld id="{18BDFEC3-8487-43E8-A154-7C12CBC1FFF2}" type="slidenum">
+              <a:rPr lang="en-US"/>
+              <a:t>8</a:t>
+            </a:fld>
+            <a:endParaRPr lang="en-US"/>
+          </a:p>
+        </p:txBody>
+      </p:sp>
+    </p:spTree>
+  </p:cSld>
+</p:notes>
+</file>
+
+<file path=ppt/notesSlides/notesSlide6.xml><?xml version="1.0" encoding="utf-8"?>
+<p:notes xmlns:a="http://schemas.openxmlformats.org/drawingml/2006/main" xmlns:r="http://schemas.openxmlformats.org/officeDocument/2006/relationships" xmlns:p="http://schemas.openxmlformats.org/presentationml/2006/main">
+  <p:cSld>
+    <p:spTree>
+      <p:nvGrpSpPr>
+        <p:cNvPr id="1" name=""/>
+        <p:cNvGrpSpPr/>
+        <p:nvPr/>
+      </p:nvGrpSpPr>
+      <p:grpSpPr>
+        <a:xfrm>
+          <a:off x="0" y="0"/>
+          <a:ext cx="0" cy="0"/>
+          <a:chOff x="0" y="0"/>
+          <a:chExt cx="0" cy="0"/>
+        </a:xfrm>
+      </p:grpSpPr>
+      <p:sp>
+        <p:nvSpPr>
+          <p:cNvPr id="2" name="Slide Image Placeholder 1"/>
+          <p:cNvSpPr>
+            <a:spLocks noGrp="1" noRot="1" noChangeAspect="1"/>
+          </p:cNvSpPr>
+          <p:nvPr>
+            <p:ph type="sldImg"/>
+          </p:nvPr>
+        </p:nvSpPr>
+        <p:spPr/>
+      </p:sp>
+      <p:sp>
+        <p:nvSpPr>
+          <p:cNvPr id="3" name="Notes Placeholder 2"/>
+          <p:cNvSpPr>
+            <a:spLocks noGrp="1"/>
+          </p:cNvSpPr>
+          <p:nvPr>
+            <p:ph type="body" idx="1"/>
+          </p:nvPr>
+        </p:nvSpPr>
+        <p:spPr/>
+        <p:txBody>
+          <a:bodyPr/>
+          <a:lstStyle/>
+          <a:p>
+            <a:pPr lvl="0" indent="0" marL="0">
+              <a:buNone/>
+            </a:pPr>
+            <a:r>
+              <a:rPr/>
+              <a:t>Neal Wilson, pictured here, wrote a dissertation looking at lead poisoning in children. He graduated in 2021 and is currently the Associate Director for CEI. He also teaches Introduction to Economics and Economic History at the California Institute of the Arts.</a:t>
+            </a:r>
+          </a:p>
+          <a:p>
+            <a:pPr lvl="0" indent="0" marL="0">
+              <a:buNone/>
+            </a:pPr>
+          </a:p>
+          <a:p>
+            <a:pPr lvl="0" indent="0" marL="0">
+              <a:buNone/>
+            </a:pPr>
+            <a:r>
+              <a:rPr/>
+              <a:t>Like Dr. Kane, Dr. Wilson used a Bayesian model in his research and I provided some informal advice.</a:t>
+            </a:r>
+          </a:p>
+        </p:txBody>
+      </p:sp>
+      <p:sp>
+        <p:nvSpPr>
+          <p:cNvPr id="4" name="Slide Number Placeholder 3"/>
+          <p:cNvSpPr>
+            <a:spLocks noGrp="1"/>
+          </p:cNvSpPr>
+          <p:nvPr>
+            <p:ph type="sldNum" sz="quarter" idx="10"/>
+          </p:nvPr>
+        </p:nvSpPr>
+        <p:spPr/>
+        <p:txBody>
+          <a:bodyPr/>
+          <a:lstStyle/>
+          <a:p>
+            <a:fld id="{18BDFEC3-8487-43E8-A154-7C12CBC1FFF2}" type="slidenum">
+              <a:rPr lang="en-US"/>
+              <a:t>9</a:t>
+            </a:fld>
+            <a:endParaRPr lang="en-US"/>
+          </a:p>
+        </p:txBody>
+      </p:sp>
+    </p:spTree>
+  </p:cSld>
+</p:notes>
+</file>
+
+<file path=ppt/notesSlides/notesSlide7.xml><?xml version="1.0" encoding="utf-8"?>
+<p:notes xmlns:a="http://schemas.openxmlformats.org/drawingml/2006/main" xmlns:r="http://schemas.openxmlformats.org/officeDocument/2006/relationships" xmlns:p="http://schemas.openxmlformats.org/presentationml/2006/main">
+  <p:cSld>
+    <p:spTree>
+      <p:nvGrpSpPr>
+        <p:cNvPr id="1" name=""/>
+        <p:cNvGrpSpPr/>
+        <p:nvPr/>
+      </p:nvGrpSpPr>
+      <p:grpSpPr>
+        <a:xfrm>
+          <a:off x="0" y="0"/>
+          <a:ext cx="0" cy="0"/>
+          <a:chOff x="0" y="0"/>
+          <a:chExt cx="0" cy="0"/>
+        </a:xfrm>
+      </p:grpSpPr>
+      <p:sp>
+        <p:nvSpPr>
+          <p:cNvPr id="2" name="Slide Image Placeholder 1"/>
+          <p:cNvSpPr>
+            <a:spLocks noGrp="1" noRot="1" noChangeAspect="1"/>
+          </p:cNvSpPr>
+          <p:nvPr>
+            <p:ph type="sldImg"/>
+          </p:nvPr>
+        </p:nvSpPr>
+        <p:spPr/>
+      </p:sp>
+      <p:sp>
+        <p:nvSpPr>
+          <p:cNvPr id="3" name="Notes Placeholder 2"/>
+          <p:cNvSpPr>
+            <a:spLocks noGrp="1"/>
+          </p:cNvSpPr>
+          <p:nvPr>
+            <p:ph type="body" idx="1"/>
+          </p:nvPr>
+        </p:nvSpPr>
+        <p:spPr/>
+        <p:txBody>
+          <a:bodyPr/>
+          <a:lstStyle/>
+          <a:p>
+            <a:pPr lvl="0" indent="0" marL="0">
+              <a:buNone/>
+            </a:pPr>
+            <a:r>
+              <a:rPr/>
+              <a:t>The work we propose takes advantage of two key resources that already exist. The first is data from the Lead Safe Kansas City project. This program, funded by HUD, tests children for lead poisoning, home testing, and remediates if lead hazards are found. There is a massive amount of information from this project, 20 years worth of data and 18 thousand health encounters per year.</a:t>
+            </a:r>
+          </a:p>
+          <a:p>
+            <a:pPr lvl="0" indent="0" marL="0">
+              <a:buNone/>
+            </a:pPr>
+          </a:p>
+          <a:p>
+            <a:pPr lvl="0" indent="0" marL="0">
+              <a:buNone/>
+            </a:pPr>
+            <a:r>
+              <a:rPr/>
+              <a:t>The second resource is an exterior based housing survey developed by the Center for Economic Information and used in many Kansas City Missouri and Kansas City Kansas neighborhoods over the past two decades. It can be conducted by graduate students after a carefully established training program. The individual items in the survey, such as roofing condition are easily observed at the street level and can be done quickly and accurately. Our team has built extensive quality control procedures into the survey. It can be done quickly and cheaply. Our team has collected data on over 260 thousand houses over a 14 year period.</a:t>
+            </a:r>
+          </a:p>
+        </p:txBody>
+      </p:sp>
+      <p:sp>
+        <p:nvSpPr>
+          <p:cNvPr id="4" name="Slide Number Placeholder 3"/>
+          <p:cNvSpPr>
+            <a:spLocks noGrp="1"/>
+          </p:cNvSpPr>
+          <p:nvPr>
+            <p:ph type="sldNum" sz="quarter" idx="10"/>
+          </p:nvPr>
+        </p:nvSpPr>
+        <p:spPr/>
+        <p:txBody>
+          <a:bodyPr/>
+          <a:lstStyle/>
+          <a:p>
+            <a:fld id="{18BDFEC3-8487-43E8-A154-7C12CBC1FFF2}" type="slidenum">
+              <a:rPr lang="en-US"/>
+              <a:t>11</a:t>
+            </a:fld>
+            <a:endParaRPr lang="en-US"/>
+          </a:p>
+        </p:txBody>
+      </p:sp>
+    </p:spTree>
+  </p:cSld>
+</p:notes>
+</file>
+
+<file path=ppt/notesSlides/notesSlide8.xml><?xml version="1.0" encoding="utf-8"?>
+<p:notes xmlns:a="http://schemas.openxmlformats.org/drawingml/2006/main" xmlns:r="http://schemas.openxmlformats.org/officeDocument/2006/relationships" xmlns:p="http://schemas.openxmlformats.org/presentationml/2006/main">
+  <p:cSld>
+    <p:spTree>
+      <p:nvGrpSpPr>
+        <p:cNvPr id="1" name=""/>
+        <p:cNvGrpSpPr/>
+        <p:nvPr/>
+      </p:nvGrpSpPr>
+      <p:grpSpPr>
+        <a:xfrm>
+          <a:off x="0" y="0"/>
+          <a:ext cx="0" cy="0"/>
+          <a:chOff x="0" y="0"/>
+          <a:chExt cx="0" cy="0"/>
+        </a:xfrm>
+      </p:grpSpPr>
+      <p:sp>
+        <p:nvSpPr>
+          <p:cNvPr id="2" name="Slide Image Placeholder 1"/>
+          <p:cNvSpPr>
+            <a:spLocks noGrp="1" noRot="1" noChangeAspect="1"/>
+          </p:cNvSpPr>
+          <p:nvPr>
+            <p:ph type="sldImg"/>
+          </p:nvPr>
+        </p:nvSpPr>
+        <p:spPr/>
+      </p:sp>
+      <p:sp>
+        <p:nvSpPr>
+          <p:cNvPr id="3" name="Notes Placeholder 2"/>
+          <p:cNvSpPr>
+            <a:spLocks noGrp="1"/>
+          </p:cNvSpPr>
+          <p:nvPr>
+            <p:ph type="body" idx="1"/>
+          </p:nvPr>
+        </p:nvSpPr>
+        <p:spPr/>
+        <p:txBody>
+          <a:bodyPr/>
+          <a:lstStyle/>
+          <a:p>
+            <a:pPr lvl="0" indent="0" marL="0">
+              <a:buNone/>
+            </a:pPr>
+            <a:r>
+              <a:rPr/>
+              <a:t>We will describe the extent to which different interventions have made housing lead safe by HUD standards and how this leads to fewer lead poisoned children among those who move into a home after remediation activity.</a:t>
+            </a:r>
+          </a:p>
+        </p:txBody>
+      </p:sp>
+      <p:sp>
+        <p:nvSpPr>
+          <p:cNvPr id="4" name="Slide Number Placeholder 3"/>
+          <p:cNvSpPr>
+            <a:spLocks noGrp="1"/>
+          </p:cNvSpPr>
+          <p:nvPr>
+            <p:ph type="sldNum" sz="quarter" idx="10"/>
+          </p:nvPr>
+        </p:nvSpPr>
+        <p:spPr/>
+        <p:txBody>
+          <a:bodyPr/>
+          <a:lstStyle/>
+          <a:p>
+            <a:fld id="{18BDFEC3-8487-43E8-A154-7C12CBC1FFF2}" type="slidenum">
+              <a:rPr lang="en-US"/>
+              <a:t>12</a:t>
+            </a:fld>
+            <a:endParaRPr lang="en-US"/>
+          </a:p>
+        </p:txBody>
+      </p:sp>
+    </p:spTree>
+  </p:cSld>
+</p:notes>
+</file>
+
+<file path=ppt/notesSlides/notesSlide9.xml><?xml version="1.0" encoding="utf-8"?>
+<p:notes xmlns:a="http://schemas.openxmlformats.org/drawingml/2006/main" xmlns:r="http://schemas.openxmlformats.org/officeDocument/2006/relationships" xmlns:p="http://schemas.openxmlformats.org/presentationml/2006/main">
+  <p:cSld>
+    <p:spTree>
+      <p:nvGrpSpPr>
+        <p:cNvPr id="1" name=""/>
+        <p:cNvGrpSpPr/>
+        <p:nvPr/>
+      </p:nvGrpSpPr>
+      <p:grpSpPr>
+        <a:xfrm>
+          <a:off x="0" y="0"/>
+          <a:ext cx="0" cy="0"/>
+          <a:chOff x="0" y="0"/>
+          <a:chExt cx="0" cy="0"/>
+        </a:xfrm>
+      </p:grpSpPr>
+      <p:sp>
+        <p:nvSpPr>
+          <p:cNvPr id="2" name="Slide Image Placeholder 1"/>
+          <p:cNvSpPr>
+            <a:spLocks noGrp="1" noRot="1" noChangeAspect="1"/>
+          </p:cNvSpPr>
+          <p:nvPr>
+            <p:ph type="sldImg"/>
+          </p:nvPr>
+        </p:nvSpPr>
+        <p:spPr/>
+      </p:sp>
+      <p:sp>
+        <p:nvSpPr>
+          <p:cNvPr id="3" name="Notes Placeholder 2"/>
+          <p:cNvSpPr>
+            <a:spLocks noGrp="1"/>
+          </p:cNvSpPr>
+          <p:nvPr>
+            <p:ph type="body" idx="1"/>
+          </p:nvPr>
+        </p:nvSpPr>
+        <p:spPr/>
+        <p:txBody>
+          <a:bodyPr/>
+          <a:lstStyle/>
+          <a:p>
+            <a:pPr lvl="0" indent="0" marL="0">
+              <a:buNone/>
+            </a:pPr>
+            <a:r>
+              <a:rPr/>
+              <a:t>Our agenda is to develop a primary prevention technique based on exterior housing observations as well as neighborhood level social determinants of health. The goal will be to develop a data-driven, housing-based index that Lead Hazard Control programs can use to select the homes most in need of lead-based hazard remediation.</a:t>
+            </a:r>
+          </a:p>
+        </p:txBody>
+      </p:sp>
+      <p:sp>
+        <p:nvSpPr>
+          <p:cNvPr id="4" name="Slide Number Placeholder 3"/>
+          <p:cNvSpPr>
+            <a:spLocks noGrp="1"/>
+          </p:cNvSpPr>
+          <p:nvPr>
+            <p:ph type="sldNum" sz="quarter" idx="10"/>
+          </p:nvPr>
+        </p:nvSpPr>
+        <p:spPr/>
+        <p:txBody>
+          <a:bodyPr/>
+          <a:lstStyle/>
+          <a:p>
+            <a:fld id="{18BDFEC3-8487-43E8-A154-7C12CBC1FFF2}" type="slidenum">
+              <a:rPr lang="en-US"/>
+              <a:t>13</a:t>
             </a:fld>
             <a:endParaRPr lang="en-US"/>
           </a:p>
@@ -3918,6 +4530,468 @@
 </p:sld>
 </file>
 
+<file path=ppt/slides/slide10.xml><?xml version="1.0" encoding="utf-8"?>
+<p:sld xmlns:a="http://schemas.openxmlformats.org/drawingml/2006/main" xmlns:r="http://schemas.openxmlformats.org/officeDocument/2006/relationships" xmlns:p="http://schemas.openxmlformats.org/presentationml/2006/main">
+  <p:cSld>
+    <p:spTree>
+      <p:nvGrpSpPr>
+        <p:cNvPr id="1" name=""/>
+        <p:cNvGrpSpPr/>
+        <p:nvPr/>
+      </p:nvGrpSpPr>
+      <p:grpSpPr>
+        <a:xfrm>
+          <a:off x="0" y="0"/>
+          <a:ext cx="0" cy="0"/>
+          <a:chOff x="0" y="0"/>
+          <a:chExt cx="0" cy="0"/>
+        </a:xfrm>
+      </p:grpSpPr>
+      <p:sp>
+        <p:nvSpPr>
+          <p:cNvPr id="2" name="Title 1"/>
+          <p:cNvSpPr>
+            <a:spLocks noGrp="1"/>
+          </p:cNvSpPr>
+          <p:nvPr>
+            <p:ph type="title"/>
+          </p:nvPr>
+        </p:nvSpPr>
+        <p:spPr/>
+        <p:txBody>
+          <a:bodyPr/>
+          <a:lstStyle/>
+          <a:p>
+            <a:pPr lvl="0" indent="0" marL="0">
+              <a:buNone/>
+            </a:pPr>
+            <a:r>
+              <a:rPr/>
+              <a:t>Housing and Urban Development</a:t>
+            </a:r>
+          </a:p>
+        </p:txBody>
+      </p:sp>
+      <p:pic>
+        <p:nvPicPr>
+          <p:cNvPr descr="../images/hud.jpg" id="0" name="Picture 1"/>
+          <p:cNvPicPr>
+            <a:picLocks noGrp="1" noChangeAspect="1"/>
+          </p:cNvPicPr>
+          <p:nvPr/>
+        </p:nvPicPr>
+        <p:blipFill>
+          <a:blip r:embed="rId2"/>
+          <a:stretch>
+            <a:fillRect/>
+          </a:stretch>
+        </p:blipFill>
+        <p:spPr bwMode="auto">
+          <a:xfrm>
+            <a:off x="1714500" y="1193800"/>
+            <a:ext cx="5715000" cy="3390900"/>
+          </a:xfrm>
+          <a:prstGeom prst="rect">
+            <a:avLst/>
+          </a:prstGeom>
+          <a:noFill/>
+          <a:ln w="9525">
+            <a:noFill/>
+            <a:headEnd/>
+            <a:tailEnd/>
+          </a:ln>
+        </p:spPr>
+      </p:pic>
+    </p:spTree>
+  </p:cSld>
+</p:sld>
+</file>
+
+<file path=ppt/slides/slide11.xml><?xml version="1.0" encoding="utf-8"?>
+<p:sld xmlns:a="http://schemas.openxmlformats.org/drawingml/2006/main" xmlns:r="http://schemas.openxmlformats.org/officeDocument/2006/relationships" xmlns:p="http://schemas.openxmlformats.org/presentationml/2006/main">
+  <p:cSld>
+    <p:spTree>
+      <p:nvGrpSpPr>
+        <p:cNvPr id="1" name=""/>
+        <p:cNvGrpSpPr/>
+        <p:nvPr/>
+      </p:nvGrpSpPr>
+      <p:grpSpPr>
+        <a:xfrm>
+          <a:off x="0" y="0"/>
+          <a:ext cx="0" cy="0"/>
+          <a:chOff x="0" y="0"/>
+          <a:chExt cx="0" cy="0"/>
+        </a:xfrm>
+      </p:grpSpPr>
+      <p:sp>
+        <p:nvSpPr>
+          <p:cNvPr id="2" name="Title 1"/>
+          <p:cNvSpPr>
+            <a:spLocks noGrp="1"/>
+          </p:cNvSpPr>
+          <p:nvPr>
+            <p:ph type="title"/>
+          </p:nvPr>
+        </p:nvSpPr>
+        <p:spPr/>
+        <p:txBody>
+          <a:bodyPr/>
+          <a:lstStyle/>
+          <a:p>
+            <a:pPr lvl="0" indent="0" marL="0">
+              <a:buNone/>
+            </a:pPr>
+            <a:r>
+              <a:rPr/>
+              <a:t>Leveraging existing resources</a:t>
+            </a:r>
+          </a:p>
+        </p:txBody>
+      </p:sp>
+      <p:sp>
+        <p:nvSpPr>
+          <p:cNvPr id="3" name="Content Placeholder 2"/>
+          <p:cNvSpPr>
+            <a:spLocks noGrp="1"/>
+          </p:cNvSpPr>
+          <p:nvPr>
+            <p:ph idx="1"/>
+          </p:nvPr>
+        </p:nvSpPr>
+        <p:spPr/>
+        <p:txBody>
+          <a:bodyPr/>
+          <a:lstStyle/>
+          <a:p>
+            <a:pPr lvl="0"/>
+            <a:r>
+              <a:rPr/>
+              <a:t>Project Lead Safe Kansas City</a:t>
+            </a:r>
+          </a:p>
+          <a:p>
+            <a:pPr lvl="1"/>
+            <a:r>
+              <a:rPr/>
+              <a:t>20 years of data</a:t>
+            </a:r>
+          </a:p>
+          <a:p>
+            <a:pPr lvl="1"/>
+            <a:r>
+              <a:rPr/>
+              <a:t>18 thousand health encounters per year</a:t>
+            </a:r>
+          </a:p>
+          <a:p>
+            <a:pPr lvl="0"/>
+            <a:r>
+              <a:rPr/>
+              <a:t>Exterior based housing survey</a:t>
+            </a:r>
+          </a:p>
+          <a:p>
+            <a:pPr lvl="1"/>
+            <a:r>
+              <a:rPr/>
+              <a:t>Quick, easy, cost effective ($6.50 per parcel)</a:t>
+            </a:r>
+          </a:p>
+          <a:p>
+            <a:pPr lvl="1"/>
+            <a:r>
+              <a:rPr/>
+              <a:t>Can be done at the street level</a:t>
+            </a:r>
+          </a:p>
+          <a:p>
+            <a:pPr lvl="1"/>
+            <a:r>
+              <a:rPr/>
+              <a:t>Extensive quality control procedures</a:t>
+            </a:r>
+          </a:p>
+          <a:p>
+            <a:pPr lvl="1"/>
+            <a:r>
+              <a:rPr/>
+              <a:t>Used routinely for over 260 thousand houses over 14 years.</a:t>
+            </a:r>
+          </a:p>
+        </p:txBody>
+      </p:sp>
+    </p:spTree>
+  </p:cSld>
+</p:sld>
+</file>
+
+<file path=ppt/slides/slide12.xml><?xml version="1.0" encoding="utf-8"?>
+<p:sld xmlns:a="http://schemas.openxmlformats.org/drawingml/2006/main" xmlns:r="http://schemas.openxmlformats.org/officeDocument/2006/relationships" xmlns:p="http://schemas.openxmlformats.org/presentationml/2006/main">
+  <p:cSld>
+    <p:spTree>
+      <p:nvGrpSpPr>
+        <p:cNvPr id="1" name=""/>
+        <p:cNvGrpSpPr/>
+        <p:nvPr/>
+      </p:nvGrpSpPr>
+      <p:grpSpPr>
+        <a:xfrm>
+          <a:off x="0" y="0"/>
+          <a:ext cx="0" cy="0"/>
+          <a:chOff x="0" y="0"/>
+          <a:chExt cx="0" cy="0"/>
+        </a:xfrm>
+      </p:grpSpPr>
+      <p:sp>
+        <p:nvSpPr>
+          <p:cNvPr id="2" name="Title 1"/>
+          <p:cNvSpPr>
+            <a:spLocks noGrp="1"/>
+          </p:cNvSpPr>
+          <p:nvPr>
+            <p:ph type="title"/>
+          </p:nvPr>
+        </p:nvSpPr>
+        <p:spPr/>
+        <p:txBody>
+          <a:bodyPr/>
+          <a:lstStyle/>
+          <a:p>
+            <a:pPr lvl="0" indent="0" marL="0">
+              <a:buNone/>
+            </a:pPr>
+            <a:r>
+              <a:rPr/>
+              <a:t>Aim 1.</a:t>
+            </a:r>
+          </a:p>
+        </p:txBody>
+      </p:sp>
+      <p:sp>
+        <p:nvSpPr>
+          <p:cNvPr id="3" name="Content Placeholder 2"/>
+          <p:cNvSpPr>
+            <a:spLocks noGrp="1"/>
+          </p:cNvSpPr>
+          <p:nvPr>
+            <p:ph idx="1"/>
+          </p:nvPr>
+        </p:nvSpPr>
+        <p:spPr/>
+        <p:txBody>
+          <a:bodyPr/>
+          <a:lstStyle/>
+          <a:p>
+            <a:pPr lvl="0"/>
+            <a:r>
+              <a:rPr/>
+              <a:t>Quantify improvements made by KC Lead Safe</a:t>
+            </a:r>
+          </a:p>
+          <a:p>
+            <a:pPr lvl="1"/>
+            <a:r>
+              <a:rPr/>
+              <a:t>Trends over time versus national trends</a:t>
+            </a:r>
+          </a:p>
+          <a:p>
+            <a:pPr lvl="1"/>
+            <a:r>
+              <a:rPr/>
+              <a:t>Identify and evaluate children who move into remediated homes.</a:t>
+            </a:r>
+          </a:p>
+        </p:txBody>
+      </p:sp>
+    </p:spTree>
+  </p:cSld>
+</p:sld>
+</file>
+
+<file path=ppt/slides/slide13.xml><?xml version="1.0" encoding="utf-8"?>
+<p:sld xmlns:a="http://schemas.openxmlformats.org/drawingml/2006/main" xmlns:r="http://schemas.openxmlformats.org/officeDocument/2006/relationships" xmlns:p="http://schemas.openxmlformats.org/presentationml/2006/main">
+  <p:cSld>
+    <p:spTree>
+      <p:nvGrpSpPr>
+        <p:cNvPr id="1" name=""/>
+        <p:cNvGrpSpPr/>
+        <p:nvPr/>
+      </p:nvGrpSpPr>
+      <p:grpSpPr>
+        <a:xfrm>
+          <a:off x="0" y="0"/>
+          <a:ext cx="0" cy="0"/>
+          <a:chOff x="0" y="0"/>
+          <a:chExt cx="0" cy="0"/>
+        </a:xfrm>
+      </p:grpSpPr>
+      <p:sp>
+        <p:nvSpPr>
+          <p:cNvPr id="2" name="Title 1"/>
+          <p:cNvSpPr>
+            <a:spLocks noGrp="1"/>
+          </p:cNvSpPr>
+          <p:nvPr>
+            <p:ph type="title"/>
+          </p:nvPr>
+        </p:nvSpPr>
+        <p:spPr/>
+        <p:txBody>
+          <a:bodyPr/>
+          <a:lstStyle/>
+          <a:p>
+            <a:pPr lvl="0" indent="0" marL="0">
+              <a:buNone/>
+            </a:pPr>
+            <a:r>
+              <a:rPr/>
+              <a:t>Aim 2</a:t>
+            </a:r>
+          </a:p>
+        </p:txBody>
+      </p:sp>
+      <p:sp>
+        <p:nvSpPr>
+          <p:cNvPr id="3" name="Content Placeholder 2"/>
+          <p:cNvSpPr>
+            <a:spLocks noGrp="1"/>
+          </p:cNvSpPr>
+          <p:nvPr>
+            <p:ph idx="1"/>
+          </p:nvPr>
+        </p:nvSpPr>
+        <p:spPr/>
+        <p:txBody>
+          <a:bodyPr/>
+          <a:lstStyle/>
+          <a:p>
+            <a:pPr lvl="0"/>
+            <a:r>
+              <a:rPr/>
+              <a:t>Validate use of exterior survey to identify high risk homes</a:t>
+            </a:r>
+          </a:p>
+          <a:p>
+            <a:pPr lvl="1"/>
+            <a:r>
+              <a:rPr/>
+              <a:t>Conduct survey in 60 census tracts</a:t>
+            </a:r>
+          </a:p>
+          <a:p>
+            <a:pPr lvl="1"/>
+            <a:r>
+              <a:rPr/>
+              <a:t>Select 50 houses with high score on survey</a:t>
+            </a:r>
+          </a:p>
+          <a:p>
+            <a:pPr lvl="1"/>
+            <a:r>
+              <a:rPr/>
+              <a:t>Compare to 50 neighboring control houses</a:t>
+            </a:r>
+          </a:p>
+        </p:txBody>
+      </p:sp>
+    </p:spTree>
+  </p:cSld>
+</p:sld>
+</file>
+
+<file path=ppt/slides/slide14.xml><?xml version="1.0" encoding="utf-8"?>
+<p:sld xmlns:a="http://schemas.openxmlformats.org/drawingml/2006/main" xmlns:r="http://schemas.openxmlformats.org/officeDocument/2006/relationships" xmlns:p="http://schemas.openxmlformats.org/presentationml/2006/main">
+  <p:cSld>
+    <p:spTree>
+      <p:nvGrpSpPr>
+        <p:cNvPr id="1" name=""/>
+        <p:cNvGrpSpPr/>
+        <p:nvPr/>
+      </p:nvGrpSpPr>
+      <p:grpSpPr>
+        <a:xfrm>
+          <a:off x="0" y="0"/>
+          <a:ext cx="0" cy="0"/>
+          <a:chOff x="0" y="0"/>
+          <a:chExt cx="0" cy="0"/>
+        </a:xfrm>
+      </p:grpSpPr>
+      <p:sp>
+        <p:nvSpPr>
+          <p:cNvPr id="2" name="Title 1"/>
+          <p:cNvSpPr>
+            <a:spLocks noGrp="1"/>
+          </p:cNvSpPr>
+          <p:nvPr>
+            <p:ph type="title"/>
+          </p:nvPr>
+        </p:nvSpPr>
+        <p:spPr/>
+        <p:txBody>
+          <a:bodyPr/>
+          <a:lstStyle/>
+          <a:p>
+            <a:pPr lvl="0" indent="0" marL="0">
+              <a:buNone/>
+            </a:pPr>
+            <a:r>
+              <a:rPr/>
+              <a:t>Strengths of the research</a:t>
+            </a:r>
+          </a:p>
+        </p:txBody>
+      </p:sp>
+      <p:sp>
+        <p:nvSpPr>
+          <p:cNvPr id="3" name="Content Placeholder 2"/>
+          <p:cNvSpPr>
+            <a:spLocks noGrp="1"/>
+          </p:cNvSpPr>
+          <p:nvPr>
+            <p:ph idx="1"/>
+          </p:nvPr>
+        </p:nvSpPr>
+        <p:spPr/>
+        <p:txBody>
+          <a:bodyPr/>
+          <a:lstStyle/>
+          <a:p>
+            <a:pPr lvl="0"/>
+            <a:r>
+              <a:rPr/>
+              <a:t>Leverage existing resources to solve new problems</a:t>
+            </a:r>
+          </a:p>
+          <a:p>
+            <a:pPr lvl="0"/>
+            <a:r>
+              <a:rPr/>
+              <a:t>Use of cost-effective methods</a:t>
+            </a:r>
+          </a:p>
+          <a:p>
+            <a:pPr lvl="0"/>
+            <a:r>
+              <a:rPr/>
+              <a:t>Extensive QC already in place</a:t>
+            </a:r>
+          </a:p>
+          <a:p>
+            <a:pPr lvl="0"/>
+            <a:r>
+              <a:rPr/>
+              <a:t>Approach easily extended to other communities</a:t>
+            </a:r>
+          </a:p>
+        </p:txBody>
+      </p:sp>
+    </p:spTree>
+  </p:cSld>
+</p:sld>
+</file>
+
 <file path=ppt/slides/slide2.xml><?xml version="1.0" encoding="utf-8"?>
 <p:sld xmlns:a="http://schemas.openxmlformats.org/drawingml/2006/main" xmlns:r="http://schemas.openxmlformats.org/officeDocument/2006/relationships" xmlns:p="http://schemas.openxmlformats.org/presentationml/2006/main">
   <p:cSld>
@@ -3955,7 +5029,7 @@
             </a:pPr>
             <a:r>
               <a:rPr/>
-              <a:t>Historical overview</a:t>
+              <a:t>How this all started</a:t>
             </a:r>
           </a:p>
         </p:txBody>
@@ -3969,7 +5043,7 @@
           <p:nvPr/>
         </p:nvPicPr>
         <p:blipFill>
-          <a:blip r:embed="rId2"/>
+          <a:blip r:embed="rId3"/>
           <a:stretch>
             <a:fillRect/>
           </a:stretch>
@@ -4032,83 +5106,41 @@
             </a:pPr>
             <a:r>
               <a:rPr/>
-              <a:t>Leveraging existing resources</a:t>
-            </a:r>
-          </a:p>
-        </p:txBody>
-      </p:sp>
-      <p:sp>
-        <p:nvSpPr>
-          <p:cNvPr id="3" name="Content Placeholder 2"/>
-          <p:cNvSpPr>
-            <a:spLocks noGrp="1"/>
-          </p:cNvSpPr>
-          <p:nvPr>
-            <p:ph idx="1"/>
-          </p:nvPr>
-        </p:nvSpPr>
-        <p:spPr/>
-        <p:txBody>
-          <a:bodyPr/>
-          <a:lstStyle/>
-          <a:p>
-            <a:pPr lvl="0"/>
-            <a:r>
-              <a:rPr/>
-              <a:t>Project Lead Safe Kansas City</a:t>
-            </a:r>
-          </a:p>
-          <a:p>
-            <a:pPr lvl="1"/>
-            <a:r>
-              <a:rPr/>
-              <a:t>20 years of data</a:t>
-            </a:r>
-          </a:p>
-          <a:p>
-            <a:pPr lvl="1"/>
-            <a:r>
-              <a:rPr/>
-              <a:t>18 thousand health encounters per year</a:t>
-            </a:r>
-          </a:p>
-          <a:p>
-            <a:pPr lvl="0"/>
-            <a:r>
-              <a:rPr/>
-              <a:t>Exterior based housing survey</a:t>
-            </a:r>
-          </a:p>
-          <a:p>
-            <a:pPr lvl="1"/>
-            <a:r>
-              <a:rPr/>
-              <a:t>Quick, easy, cost effective ($6.50 per parcel)</a:t>
-            </a:r>
-          </a:p>
-          <a:p>
-            <a:pPr lvl="1"/>
-            <a:r>
-              <a:rPr/>
-              <a:t>Can be done at the street level</a:t>
-            </a:r>
-          </a:p>
-          <a:p>
-            <a:pPr lvl="1"/>
-            <a:r>
-              <a:rPr/>
-              <a:t>Extensive quality control procedures</a:t>
-            </a:r>
-          </a:p>
-          <a:p>
-            <a:pPr lvl="1"/>
-            <a:r>
-              <a:rPr/>
-              <a:t>Used routinely for over 260 thousand houses over 14 years.</a:t>
-            </a:r>
-          </a:p>
-        </p:txBody>
-      </p:sp>
+              <a:t>The Center for Economic Information</a:t>
+            </a:r>
+          </a:p>
+        </p:txBody>
+      </p:sp>
+      <p:pic>
+        <p:nvPicPr>
+          <p:cNvPr descr="../images/cei.png" id="0" name="Picture 1"/>
+          <p:cNvPicPr>
+            <a:picLocks noGrp="1" noChangeAspect="1"/>
+          </p:cNvPicPr>
+          <p:nvPr/>
+        </p:nvPicPr>
+        <p:blipFill>
+          <a:blip r:embed="rId2"/>
+          <a:stretch>
+            <a:fillRect/>
+          </a:stretch>
+        </p:blipFill>
+        <p:spPr bwMode="auto">
+          <a:xfrm>
+            <a:off x="2616200" y="1193800"/>
+            <a:ext cx="3911600" cy="3390900"/>
+          </a:xfrm>
+          <a:prstGeom prst="rect">
+            <a:avLst/>
+          </a:prstGeom>
+          <a:noFill/>
+          <a:ln w="9525">
+            <a:noFill/>
+            <a:headEnd/>
+            <a:tailEnd/>
+          </a:ln>
+        </p:spPr>
+      </p:pic>
     </p:spTree>
   </p:cSld>
 </p:sld>
@@ -4133,12 +5165,12 @@
       </p:grpSpPr>
       <p:sp>
         <p:nvSpPr>
-          <p:cNvPr id="2" name="Title 1"/>
-          <p:cNvSpPr>
-            <a:spLocks noGrp="1"/>
-          </p:cNvSpPr>
-          <p:nvPr>
-            <p:ph type="title"/>
+          <p:cNvPr id="3" name="Content Placeholder 2"/>
+          <p:cNvSpPr>
+            <a:spLocks noGrp="1"/>
+          </p:cNvSpPr>
+          <p:nvPr>
+            <p:ph idx="1"/>
           </p:nvPr>
         </p:nvSpPr>
         <p:spPr/>
@@ -4151,44 +5183,7 @@
             </a:pPr>
             <a:r>
               <a:rPr/>
-              <a:t>Aim 1.</a:t>
-            </a:r>
-          </a:p>
-        </p:txBody>
-      </p:sp>
-      <p:sp>
-        <p:nvSpPr>
-          <p:cNvPr id="3" name="Content Placeholder 2"/>
-          <p:cNvSpPr>
-            <a:spLocks noGrp="1"/>
-          </p:cNvSpPr>
-          <p:nvPr>
-            <p:ph idx="1"/>
-          </p:nvPr>
-        </p:nvSpPr>
-        <p:spPr/>
-        <p:txBody>
-          <a:bodyPr/>
-          <a:lstStyle/>
-          <a:p>
-            <a:pPr lvl="0"/>
-            <a:r>
-              <a:rPr/>
-              <a:t>Quantify improvements made by KC Lead Safe</a:t>
-            </a:r>
-          </a:p>
-          <a:p>
-            <a:pPr lvl="1"/>
-            <a:r>
-              <a:rPr/>
-              <a:t>Trends over time versus national trends</a:t>
-            </a:r>
-          </a:p>
-          <a:p>
-            <a:pPr lvl="1"/>
-            <a:r>
-              <a:rPr/>
-              <a:t>Identify and evaluate children who move into remediated homes.</a:t>
+              <a:t>The Center for Economic Information was started in 1994 and has worked with neighborhoods and communities in the Kansas City metropolitan area to provide them with data from a variety sources, including the Bureau of the Census.</a:t>
             </a:r>
           </a:p>
         </p:txBody>
@@ -4235,55 +5230,41 @@
             </a:pPr>
             <a:r>
               <a:rPr/>
-              <a:t>Aim 2</a:t>
-            </a:r>
-          </a:p>
-        </p:txBody>
-      </p:sp>
-      <p:sp>
-        <p:nvSpPr>
-          <p:cNvPr id="3" name="Content Placeholder 2"/>
-          <p:cNvSpPr>
-            <a:spLocks noGrp="1"/>
-          </p:cNvSpPr>
-          <p:nvPr>
-            <p:ph idx="1"/>
-          </p:nvPr>
-        </p:nvSpPr>
-        <p:spPr/>
-        <p:txBody>
-          <a:bodyPr/>
-          <a:lstStyle/>
-          <a:p>
-            <a:pPr lvl="0"/>
-            <a:r>
-              <a:rPr/>
-              <a:t>Validate use of exterior survey to identify high risk homes</a:t>
-            </a:r>
-          </a:p>
-          <a:p>
-            <a:pPr lvl="1"/>
-            <a:r>
-              <a:rPr/>
-              <a:t>Conduct survey in 60 census tracts</a:t>
-            </a:r>
-          </a:p>
-          <a:p>
-            <a:pPr lvl="1"/>
-            <a:r>
-              <a:rPr/>
-              <a:t>Select 50 houses with high score on survey</a:t>
-            </a:r>
-          </a:p>
-          <a:p>
-            <a:pPr lvl="1"/>
-            <a:r>
-              <a:rPr/>
-              <a:t>Compare to 50 neighboring control houses</a:t>
-            </a:r>
-          </a:p>
-        </p:txBody>
-      </p:sp>
+              <a:t>Single family home ownership by neighborhood</a:t>
+            </a:r>
+          </a:p>
+        </p:txBody>
+      </p:sp>
+      <p:pic>
+        <p:nvPicPr>
+          <p:cNvPr descr="../images/map.png" id="0" name="Picture 1"/>
+          <p:cNvPicPr>
+            <a:picLocks noGrp="1" noChangeAspect="1"/>
+          </p:cNvPicPr>
+          <p:nvPr/>
+        </p:nvPicPr>
+        <p:blipFill>
+          <a:blip r:embed="rId3"/>
+          <a:stretch>
+            <a:fillRect/>
+          </a:stretch>
+        </p:blipFill>
+        <p:spPr bwMode="auto">
+          <a:xfrm>
+            <a:off x="2374900" y="1193800"/>
+            <a:ext cx="4381500" cy="3390900"/>
+          </a:xfrm>
+          <a:prstGeom prst="rect">
+            <a:avLst/>
+          </a:prstGeom>
+          <a:noFill/>
+          <a:ln w="9525">
+            <a:noFill/>
+            <a:headEnd/>
+            <a:tailEnd/>
+          </a:ln>
+        </p:spPr>
+      </p:pic>
     </p:spTree>
   </p:cSld>
 </p:sld>
@@ -4326,7 +5307,7 @@
             </a:pPr>
             <a:r>
               <a:rPr/>
-              <a:t>Strengths of the research</a:t>
+              <a:t>Neighborhood housing condition survey (1/2)</a:t>
             </a:r>
           </a:p>
         </p:txBody>
@@ -4349,32 +5330,319 @@
             <a:pPr lvl="0"/>
             <a:r>
               <a:rPr/>
-              <a:t>Leverage existing resources to solve new problems</a:t>
+              <a:t>Fifteen ratings in three categories</a:t>
+            </a:r>
+          </a:p>
+          <a:p>
+            <a:pPr lvl="1"/>
+            <a:r>
+              <a:rPr/>
+              <a:t>Structure</a:t>
+            </a:r>
+          </a:p>
+          <a:p>
+            <a:pPr lvl="1"/>
+            <a:r>
+              <a:rPr/>
+              <a:t>Grounds</a:t>
+            </a:r>
+          </a:p>
+          <a:p>
+            <a:pPr lvl="1"/>
+            <a:r>
+              <a:rPr/>
+              <a:t>Infrastructure</a:t>
             </a:r>
           </a:p>
           <a:p>
             <a:pPr lvl="0"/>
             <a:r>
               <a:rPr/>
-              <a:t>Use of cost-effective methods</a:t>
-            </a:r>
-          </a:p>
+              <a:t>Classification of the parcel</a:t>
+            </a:r>
+          </a:p>
+        </p:txBody>
+      </p:sp>
+    </p:spTree>
+  </p:cSld>
+</p:sld>
+</file>
+
+<file path=ppt/slides/slide7.xml><?xml version="1.0" encoding="utf-8"?>
+<p:sld xmlns:a="http://schemas.openxmlformats.org/drawingml/2006/main" xmlns:r="http://schemas.openxmlformats.org/officeDocument/2006/relationships" xmlns:p="http://schemas.openxmlformats.org/presentationml/2006/main">
+  <p:cSld>
+    <p:spTree>
+      <p:nvGrpSpPr>
+        <p:cNvPr id="1" name=""/>
+        <p:cNvGrpSpPr/>
+        <p:nvPr/>
+      </p:nvGrpSpPr>
+      <p:grpSpPr>
+        <a:xfrm>
+          <a:off x="0" y="0"/>
+          <a:ext cx="0" cy="0"/>
+          <a:chOff x="0" y="0"/>
+          <a:chExt cx="0" cy="0"/>
+        </a:xfrm>
+      </p:grpSpPr>
+      <p:sp>
+        <p:nvSpPr>
+          <p:cNvPr id="2" name="Title 1"/>
+          <p:cNvSpPr>
+            <a:spLocks noGrp="1"/>
+          </p:cNvSpPr>
+          <p:nvPr>
+            <p:ph type="title"/>
+          </p:nvPr>
+        </p:nvSpPr>
+        <p:spPr/>
+        <p:txBody>
+          <a:bodyPr/>
+          <a:lstStyle/>
+          <a:p>
+            <a:pPr lvl="0" indent="0" marL="0">
+              <a:buNone/>
+            </a:pPr>
+            <a:r>
+              <a:rPr/>
+              <a:t>Neighborhood housing condition survey (2/2)</a:t>
+            </a:r>
+          </a:p>
+        </p:txBody>
+      </p:sp>
+      <p:sp>
+        <p:nvSpPr>
+          <p:cNvPr id="3" name="Content Placeholder 2"/>
+          <p:cNvSpPr>
+            <a:spLocks noGrp="1"/>
+          </p:cNvSpPr>
+          <p:nvPr>
+            <p:ph idx="1"/>
+          </p:nvPr>
+        </p:nvSpPr>
+        <p:spPr/>
+        <p:txBody>
+          <a:bodyPr/>
+          <a:lstStyle/>
           <a:p>
             <a:pPr lvl="0"/>
             <a:r>
               <a:rPr/>
-              <a:t>Extensive QC already in place</a:t>
+              <a:t>Evaluation done at the street level</a:t>
+            </a:r>
+          </a:p>
+          <a:p>
+            <a:pPr lvl="1"/>
+            <a:r>
+              <a:rPr/>
+              <a:t>IRB review: exempt</a:t>
+            </a:r>
+          </a:p>
+          <a:p>
+            <a:pPr lvl="2"/>
+            <a:r>
+              <a:rPr/>
+              <a:t>Observations in a public setting</a:t>
+            </a:r>
+          </a:p>
+          <a:p>
+            <a:pPr lvl="1"/>
+            <a:r>
+              <a:rPr/>
+              <a:t>Relatively inexpensive</a:t>
+            </a:r>
+          </a:p>
+          <a:p>
+            <a:pPr lvl="1"/>
+            <a:r>
+              <a:rPr/>
+              <a:t>Broad coverage across neighborhoods and years</a:t>
+            </a:r>
+          </a:p>
+          <a:p>
+            <a:pPr lvl="2"/>
+            <a:r>
+              <a:rPr/>
+              <a:t>22 surveys from 2000 through 2014</a:t>
+            </a:r>
+          </a:p>
+          <a:p>
+            <a:pPr lvl="2"/>
+            <a:r>
+              <a:rPr/>
+              <a:t>260,000 homes surveyed</a:t>
             </a:r>
           </a:p>
           <a:p>
             <a:pPr lvl="0"/>
             <a:r>
               <a:rPr/>
-              <a:t>Approach easily extended to other communities</a:t>
-            </a:r>
-          </a:p>
-        </p:txBody>
-      </p:sp>
+              <a:t>Does the home environment influence health?</a:t>
+            </a:r>
+          </a:p>
+          <a:p>
+            <a:pPr lvl="1"/>
+            <a:r>
+              <a:rPr/>
+              <a:t>YES!!!</a:t>
+            </a:r>
+          </a:p>
+        </p:txBody>
+      </p:sp>
+    </p:spTree>
+  </p:cSld>
+</p:sld>
+</file>
+
+<file path=ppt/slides/slide8.xml><?xml version="1.0" encoding="utf-8"?>
+<p:sld xmlns:a="http://schemas.openxmlformats.org/drawingml/2006/main" xmlns:r="http://schemas.openxmlformats.org/officeDocument/2006/relationships" xmlns:p="http://schemas.openxmlformats.org/presentationml/2006/main">
+  <p:cSld>
+    <p:spTree>
+      <p:nvGrpSpPr>
+        <p:cNvPr id="1" name=""/>
+        <p:cNvGrpSpPr/>
+        <p:nvPr/>
+      </p:nvGrpSpPr>
+      <p:grpSpPr>
+        <a:xfrm>
+          <a:off x="0" y="0"/>
+          <a:ext cx="0" cy="0"/>
+          <a:chOff x="0" y="0"/>
+          <a:chExt cx="0" cy="0"/>
+        </a:xfrm>
+      </p:grpSpPr>
+      <p:sp>
+        <p:nvSpPr>
+          <p:cNvPr id="2" name="Title 1"/>
+          <p:cNvSpPr>
+            <a:spLocks noGrp="1"/>
+          </p:cNvSpPr>
+          <p:nvPr>
+            <p:ph type="title"/>
+          </p:nvPr>
+        </p:nvSpPr>
+        <p:spPr/>
+        <p:txBody>
+          <a:bodyPr/>
+          <a:lstStyle/>
+          <a:p>
+            <a:pPr lvl="0" indent="0" marL="0">
+              <a:buNone/>
+            </a:pPr>
+            <a:r>
+              <a:rPr/>
+              <a:t>“An Interdisciplinary Approach to Health Disparities Research and Intervention: The Case of Childhood Asthma in Kansas City”</a:t>
+            </a:r>
+          </a:p>
+        </p:txBody>
+      </p:sp>
+      <p:pic>
+        <p:nvPicPr>
+          <p:cNvPr descr="../images/kane.png" id="0" name="Picture 1"/>
+          <p:cNvPicPr>
+            <a:picLocks noGrp="1" noChangeAspect="1"/>
+          </p:cNvPicPr>
+          <p:nvPr/>
+        </p:nvPicPr>
+        <p:blipFill>
+          <a:blip r:embed="rId3"/>
+          <a:stretch>
+            <a:fillRect/>
+          </a:stretch>
+        </p:blipFill>
+        <p:spPr bwMode="auto">
+          <a:xfrm>
+            <a:off x="3111500" y="1193800"/>
+            <a:ext cx="2933700" cy="3390900"/>
+          </a:xfrm>
+          <a:prstGeom prst="rect">
+            <a:avLst/>
+          </a:prstGeom>
+          <a:noFill/>
+          <a:ln w="9525">
+            <a:noFill/>
+            <a:headEnd/>
+            <a:tailEnd/>
+          </a:ln>
+        </p:spPr>
+      </p:pic>
+    </p:spTree>
+  </p:cSld>
+</p:sld>
+</file>
+
+<file path=ppt/slides/slide9.xml><?xml version="1.0" encoding="utf-8"?>
+<p:sld xmlns:a="http://schemas.openxmlformats.org/drawingml/2006/main" xmlns:r="http://schemas.openxmlformats.org/officeDocument/2006/relationships" xmlns:p="http://schemas.openxmlformats.org/presentationml/2006/main">
+  <p:cSld>
+    <p:spTree>
+      <p:nvGrpSpPr>
+        <p:cNvPr id="1" name=""/>
+        <p:cNvGrpSpPr/>
+        <p:nvPr/>
+      </p:nvGrpSpPr>
+      <p:grpSpPr>
+        <a:xfrm>
+          <a:off x="0" y="0"/>
+          <a:ext cx="0" cy="0"/>
+          <a:chOff x="0" y="0"/>
+          <a:chExt cx="0" cy="0"/>
+        </a:xfrm>
+      </p:grpSpPr>
+      <p:sp>
+        <p:nvSpPr>
+          <p:cNvPr id="2" name="Title 1"/>
+          <p:cNvSpPr>
+            <a:spLocks noGrp="1"/>
+          </p:cNvSpPr>
+          <p:nvPr>
+            <p:ph type="title"/>
+          </p:nvPr>
+        </p:nvSpPr>
+        <p:spPr/>
+        <p:txBody>
+          <a:bodyPr/>
+          <a:lstStyle/>
+          <a:p>
+            <a:pPr lvl="0" indent="0" marL="0">
+              <a:buNone/>
+            </a:pPr>
+            <a:r>
+              <a:rPr/>
+              <a:t>“Childhood Lead Poisoning and the Built Environment in Kansas City, Missouri, 2000-2013”</a:t>
+            </a:r>
+          </a:p>
+        </p:txBody>
+      </p:sp>
+      <p:pic>
+        <p:nvPicPr>
+          <p:cNvPr descr="../images/wilson.png" id="0" name="Picture 1"/>
+          <p:cNvPicPr>
+            <a:picLocks noGrp="1" noChangeAspect="1"/>
+          </p:cNvPicPr>
+          <p:nvPr/>
+        </p:nvPicPr>
+        <p:blipFill>
+          <a:blip r:embed="rId3"/>
+          <a:stretch>
+            <a:fillRect/>
+          </a:stretch>
+        </p:blipFill>
+        <p:spPr bwMode="auto">
+          <a:xfrm>
+            <a:off x="3302000" y="1193800"/>
+            <a:ext cx="2552700" cy="3390900"/>
+          </a:xfrm>
+          <a:prstGeom prst="rect">
+            <a:avLst/>
+          </a:prstGeom>
+          <a:noFill/>
+          <a:ln w="9525">
+            <a:noFill/>
+            <a:headEnd/>
+            <a:tailEnd/>
+          </a:ln>
+        </p:spPr>
+      </p:pic>
     </p:spTree>
   </p:cSld>
 </p:sld>

</xml_diff>

<commit_message>
Simplified slide titles for dbhi-presentation.md
</commit_message>
<xml_diff>
--- a/kc-lead-impact/results/dbhi-presentation.pptx
+++ b/kc-lead-impact/results/dbhi-presentation.pptx
@@ -5,7 +5,7 @@
     <p:sldMasterId id="2147483648" r:id="rId1"/>
   </p:sldMasterIdLst>
   <p:notesMasterIdLst>
-    <p:notesMasterId r:id="rId16"/>
+    <p:notesMasterId r:id="rId21"/>
   </p:notesMasterIdLst>
   <p:sldIdLst>
     <p:sldId id="256" r:id="rId2"/>
@@ -22,6 +22,11 @@
     <p:sldId id="267" r:id="rId13"/>
     <p:sldId id="268" r:id="rId14"/>
     <p:sldId id="269" r:id="rId15"/>
+    <p:sldId id="270" r:id="rId16"/>
+    <p:sldId id="271" r:id="rId17"/>
+    <p:sldId id="272" r:id="rId18"/>
+    <p:sldId id="273" r:id="rId19"/>
+    <p:sldId id="274" r:id="rId20"/>
   </p:sldIdLst>
   <p:sldSz cx="9144000" cy="5143500" type="screen16x9"/>
   <p:notesSz cx="6858000" cy="9144000"/>
@@ -619,6 +624,540 @@
             </a:pPr>
             <a:r>
               <a:rPr/>
+              <a:t>Most calls for grants will list who is eligible to apply for the grant. Take special note of any priority applicants. This particular grant gives some priority to new applicants. Others may give priority to young researchers or researchers from Historically Black Colleges and Universities. If you fall into a priority group, make sure that the granting agency knows this.</a:t>
+            </a:r>
+          </a:p>
+          <a:p>
+            <a:pPr lvl="0" indent="0" marL="0">
+              <a:buNone/>
+            </a:pPr>
+          </a:p>
+          <a:p>
+            <a:pPr lvl="0" indent="0" marL="0">
+              <a:buNone/>
+            </a:pPr>
+            <a:r>
+              <a:rPr/>
+              <a:t>Most calls for grants will also list things that they will not fund. The HUD grant would not fund</a:t>
+            </a:r>
+          </a:p>
+        </p:txBody>
+      </p:sp>
+      <p:sp>
+        <p:nvSpPr>
+          <p:cNvPr id="4" name="Slide Number Placeholder 3"/>
+          <p:cNvSpPr>
+            <a:spLocks noGrp="1"/>
+          </p:cNvSpPr>
+          <p:nvPr>
+            <p:ph type="sldNum" sz="quarter" idx="10"/>
+          </p:nvPr>
+        </p:nvSpPr>
+        <p:spPr/>
+        <p:txBody>
+          <a:bodyPr/>
+          <a:lstStyle/>
+          <a:p>
+            <a:fld id="{18BDFEC3-8487-43E8-A154-7C12CBC1FFF2}" type="slidenum">
+              <a:rPr lang="en-US"/>
+              <a:t>11</a:t>
+            </a:fld>
+            <a:endParaRPr lang="en-US"/>
+          </a:p>
+        </p:txBody>
+      </p:sp>
+    </p:spTree>
+  </p:cSld>
+</p:notes>
+</file>
+
+<file path=ppt/notesSlides/notesSlide11.xml><?xml version="1.0" encoding="utf-8"?>
+<p:notes xmlns:a="http://schemas.openxmlformats.org/drawingml/2006/main" xmlns:r="http://schemas.openxmlformats.org/officeDocument/2006/relationships" xmlns:p="http://schemas.openxmlformats.org/presentationml/2006/main">
+  <p:cSld>
+    <p:spTree>
+      <p:nvGrpSpPr>
+        <p:cNvPr id="1" name=""/>
+        <p:cNvGrpSpPr/>
+        <p:nvPr/>
+      </p:nvGrpSpPr>
+      <p:grpSpPr>
+        <a:xfrm>
+          <a:off x="0" y="0"/>
+          <a:ext cx="0" cy="0"/>
+          <a:chOff x="0" y="0"/>
+          <a:chExt cx="0" cy="0"/>
+        </a:xfrm>
+      </p:grpSpPr>
+      <p:sp>
+        <p:nvSpPr>
+          <p:cNvPr id="2" name="Slide Image Placeholder 1"/>
+          <p:cNvSpPr>
+            <a:spLocks noGrp="1" noRot="1" noChangeAspect="1"/>
+          </p:cNvSpPr>
+          <p:nvPr>
+            <p:ph type="sldImg"/>
+          </p:nvPr>
+        </p:nvSpPr>
+        <p:spPr/>
+      </p:sp>
+      <p:sp>
+        <p:nvSpPr>
+          <p:cNvPr id="3" name="Notes Placeholder 2"/>
+          <p:cNvSpPr>
+            <a:spLocks noGrp="1"/>
+          </p:cNvSpPr>
+          <p:nvPr>
+            <p:ph type="body" idx="1"/>
+          </p:nvPr>
+        </p:nvSpPr>
+        <p:spPr/>
+        <p:txBody>
+          <a:bodyPr/>
+          <a:lstStyle/>
+          <a:p>
+            <a:pPr lvl="0" indent="0" marL="0">
+              <a:buNone/>
+            </a:pPr>
+            <a:r>
+              <a:rPr/>
+              <a:t>HUD does something that I wish more granting agencies would do. HUD asks you to submit a pre-application and only those proposals that score highly on the pre-application will be asked to produce a lengthier and more detailed proposal.</a:t>
+            </a:r>
+          </a:p>
+          <a:p>
+            <a:pPr lvl="0" indent="0" marL="0">
+              <a:buNone/>
+            </a:pPr>
+          </a:p>
+          <a:p>
+            <a:pPr lvl="0" indent="0" marL="0">
+              <a:buNone/>
+            </a:pPr>
+            <a:r>
+              <a:rPr/>
+              <a:t>The structure and the page limits are very important here. There are restrictions on margins and font sizes. HUD notes that any pages in excess of the page limit will not be considered in evaluating the pre-proposal or full proposal.</a:t>
+            </a:r>
+          </a:p>
+        </p:txBody>
+      </p:sp>
+      <p:sp>
+        <p:nvSpPr>
+          <p:cNvPr id="4" name="Slide Number Placeholder 3"/>
+          <p:cNvSpPr>
+            <a:spLocks noGrp="1"/>
+          </p:cNvSpPr>
+          <p:nvPr>
+            <p:ph type="sldNum" sz="quarter" idx="10"/>
+          </p:nvPr>
+        </p:nvSpPr>
+        <p:spPr/>
+        <p:txBody>
+          <a:bodyPr/>
+          <a:lstStyle/>
+          <a:p>
+            <a:fld id="{18BDFEC3-8487-43E8-A154-7C12CBC1FFF2}" type="slidenum">
+              <a:rPr lang="en-US"/>
+              <a:t>12</a:t>
+            </a:fld>
+            <a:endParaRPr lang="en-US"/>
+          </a:p>
+        </p:txBody>
+      </p:sp>
+    </p:spTree>
+  </p:cSld>
+</p:notes>
+</file>
+
+<file path=ppt/notesSlides/notesSlide12.xml><?xml version="1.0" encoding="utf-8"?>
+<p:notes xmlns:a="http://schemas.openxmlformats.org/drawingml/2006/main" xmlns:r="http://schemas.openxmlformats.org/officeDocument/2006/relationships" xmlns:p="http://schemas.openxmlformats.org/presentationml/2006/main">
+  <p:cSld>
+    <p:spTree>
+      <p:nvGrpSpPr>
+        <p:cNvPr id="1" name=""/>
+        <p:cNvGrpSpPr/>
+        <p:nvPr/>
+      </p:nvGrpSpPr>
+      <p:grpSpPr>
+        <a:xfrm>
+          <a:off x="0" y="0"/>
+          <a:ext cx="0" cy="0"/>
+          <a:chOff x="0" y="0"/>
+          <a:chExt cx="0" cy="0"/>
+        </a:xfrm>
+      </p:grpSpPr>
+      <p:sp>
+        <p:nvSpPr>
+          <p:cNvPr id="2" name="Slide Image Placeholder 1"/>
+          <p:cNvSpPr>
+            <a:spLocks noGrp="1" noRot="1" noChangeAspect="1"/>
+          </p:cNvSpPr>
+          <p:nvPr>
+            <p:ph type="sldImg"/>
+          </p:nvPr>
+        </p:nvSpPr>
+        <p:spPr/>
+      </p:sp>
+      <p:sp>
+        <p:nvSpPr>
+          <p:cNvPr id="3" name="Notes Placeholder 2"/>
+          <p:cNvSpPr>
+            <a:spLocks noGrp="1"/>
+          </p:cNvSpPr>
+          <p:nvPr>
+            <p:ph type="body" idx="1"/>
+          </p:nvPr>
+        </p:nvSpPr>
+        <p:spPr/>
+        <p:txBody>
+          <a:bodyPr/>
+          <a:lstStyle/>
+          <a:p>
+            <a:pPr lvl="0" indent="0" marL="0">
+              <a:buNone/>
+            </a:pPr>
+            <a:r>
+              <a:rPr/>
+              <a:t>HUD provides a rating system for grants with various points for each element. You want to make sure that you document anything that addresses any element, no matter how small. The National Center for Healthy Housing grant that we collaborated on–it missed being funded by a single point.</a:t>
+            </a:r>
+          </a:p>
+        </p:txBody>
+      </p:sp>
+      <p:sp>
+        <p:nvSpPr>
+          <p:cNvPr id="4" name="Slide Number Placeholder 3"/>
+          <p:cNvSpPr>
+            <a:spLocks noGrp="1"/>
+          </p:cNvSpPr>
+          <p:nvPr>
+            <p:ph type="sldNum" sz="quarter" idx="10"/>
+          </p:nvPr>
+        </p:nvSpPr>
+        <p:spPr/>
+        <p:txBody>
+          <a:bodyPr/>
+          <a:lstStyle/>
+          <a:p>
+            <a:fld id="{18BDFEC3-8487-43E8-A154-7C12CBC1FFF2}" type="slidenum">
+              <a:rPr lang="en-US"/>
+              <a:t>14</a:t>
+            </a:fld>
+            <a:endParaRPr lang="en-US"/>
+          </a:p>
+        </p:txBody>
+      </p:sp>
+    </p:spTree>
+  </p:cSld>
+</p:notes>
+</file>
+
+<file path=ppt/notesSlides/notesSlide13.xml><?xml version="1.0" encoding="utf-8"?>
+<p:notes xmlns:a="http://schemas.openxmlformats.org/drawingml/2006/main" xmlns:r="http://schemas.openxmlformats.org/officeDocument/2006/relationships" xmlns:p="http://schemas.openxmlformats.org/presentationml/2006/main">
+  <p:cSld>
+    <p:spTree>
+      <p:nvGrpSpPr>
+        <p:cNvPr id="1" name=""/>
+        <p:cNvGrpSpPr/>
+        <p:nvPr/>
+      </p:nvGrpSpPr>
+      <p:grpSpPr>
+        <a:xfrm>
+          <a:off x="0" y="0"/>
+          <a:ext cx="0" cy="0"/>
+          <a:chOff x="0" y="0"/>
+          <a:chExt cx="0" cy="0"/>
+        </a:xfrm>
+      </p:grpSpPr>
+      <p:sp>
+        <p:nvSpPr>
+          <p:cNvPr id="2" name="Slide Image Placeholder 1"/>
+          <p:cNvSpPr>
+            <a:spLocks noGrp="1" noRot="1" noChangeAspect="1"/>
+          </p:cNvSpPr>
+          <p:nvPr>
+            <p:ph type="sldImg"/>
+          </p:nvPr>
+        </p:nvSpPr>
+        <p:spPr/>
+      </p:sp>
+      <p:sp>
+        <p:nvSpPr>
+          <p:cNvPr id="3" name="Notes Placeholder 2"/>
+          <p:cNvSpPr>
+            <a:spLocks noGrp="1"/>
+          </p:cNvSpPr>
+          <p:nvPr>
+            <p:ph type="body" idx="1"/>
+          </p:nvPr>
+        </p:nvSpPr>
+        <p:spPr/>
+        <p:txBody>
+          <a:bodyPr/>
+          <a:lstStyle/>
+          <a:p>
+            <a:pPr lvl="0" indent="0" marL="0">
+              <a:buNone/>
+            </a:pPr>
+            <a:r>
+              <a:rPr/>
+              <a:t>We made sure to document a solid quality assurance plan. We even designated a quality assurance role for one of the invesigators.</a:t>
+            </a:r>
+          </a:p>
+        </p:txBody>
+      </p:sp>
+      <p:sp>
+        <p:nvSpPr>
+          <p:cNvPr id="4" name="Slide Number Placeholder 3"/>
+          <p:cNvSpPr>
+            <a:spLocks noGrp="1"/>
+          </p:cNvSpPr>
+          <p:nvPr>
+            <p:ph type="sldNum" sz="quarter" idx="10"/>
+          </p:nvPr>
+        </p:nvSpPr>
+        <p:spPr/>
+        <p:txBody>
+          <a:bodyPr/>
+          <a:lstStyle/>
+          <a:p>
+            <a:fld id="{18BDFEC3-8487-43E8-A154-7C12CBC1FFF2}" type="slidenum">
+              <a:rPr lang="en-US"/>
+              <a:t>15</a:t>
+            </a:fld>
+            <a:endParaRPr lang="en-US"/>
+          </a:p>
+        </p:txBody>
+      </p:sp>
+    </p:spTree>
+  </p:cSld>
+</p:notes>
+</file>
+
+<file path=ppt/notesSlides/notesSlide14.xml><?xml version="1.0" encoding="utf-8"?>
+<p:notes xmlns:a="http://schemas.openxmlformats.org/drawingml/2006/main" xmlns:r="http://schemas.openxmlformats.org/officeDocument/2006/relationships" xmlns:p="http://schemas.openxmlformats.org/presentationml/2006/main">
+  <p:cSld>
+    <p:spTree>
+      <p:nvGrpSpPr>
+        <p:cNvPr id="1" name=""/>
+        <p:cNvGrpSpPr/>
+        <p:nvPr/>
+      </p:nvGrpSpPr>
+      <p:grpSpPr>
+        <a:xfrm>
+          <a:off x="0" y="0"/>
+          <a:ext cx="0" cy="0"/>
+          <a:chOff x="0" y="0"/>
+          <a:chExt cx="0" cy="0"/>
+        </a:xfrm>
+      </p:grpSpPr>
+      <p:sp>
+        <p:nvSpPr>
+          <p:cNvPr id="2" name="Slide Image Placeholder 1"/>
+          <p:cNvSpPr>
+            <a:spLocks noGrp="1" noRot="1" noChangeAspect="1"/>
+          </p:cNvSpPr>
+          <p:nvPr>
+            <p:ph type="sldImg"/>
+          </p:nvPr>
+        </p:nvSpPr>
+        <p:spPr/>
+      </p:sp>
+      <p:sp>
+        <p:nvSpPr>
+          <p:cNvPr id="3" name="Notes Placeholder 2"/>
+          <p:cNvSpPr>
+            <a:spLocks noGrp="1"/>
+          </p:cNvSpPr>
+          <p:nvPr>
+            <p:ph type="body" idx="1"/>
+          </p:nvPr>
+        </p:nvSpPr>
+        <p:spPr/>
+        <p:txBody>
+          <a:bodyPr/>
+          <a:lstStyle/>
+          <a:p>
+            <a:pPr lvl="0" indent="0" marL="0">
+              <a:buNone/>
+            </a:pPr>
+            <a:r>
+              <a:rPr/>
+              <a:t>It was tricky to attach a dollar value to it, but we claimed the neighborhood housing conditions survey data and a resources that would be combined with additional data to increase the effectiveness of the proposal.</a:t>
+            </a:r>
+          </a:p>
+        </p:txBody>
+      </p:sp>
+      <p:sp>
+        <p:nvSpPr>
+          <p:cNvPr id="4" name="Slide Number Placeholder 3"/>
+          <p:cNvSpPr>
+            <a:spLocks noGrp="1"/>
+          </p:cNvSpPr>
+          <p:nvPr>
+            <p:ph type="sldNum" sz="quarter" idx="10"/>
+          </p:nvPr>
+        </p:nvSpPr>
+        <p:spPr/>
+        <p:txBody>
+          <a:bodyPr/>
+          <a:lstStyle/>
+          <a:p>
+            <a:fld id="{18BDFEC3-8487-43E8-A154-7C12CBC1FFF2}" type="slidenum">
+              <a:rPr lang="en-US"/>
+              <a:t>16</a:t>
+            </a:fld>
+            <a:endParaRPr lang="en-US"/>
+          </a:p>
+        </p:txBody>
+      </p:sp>
+    </p:spTree>
+  </p:cSld>
+</p:notes>
+</file>
+
+<file path=ppt/notesSlides/notesSlide15.xml><?xml version="1.0" encoding="utf-8"?>
+<p:notes xmlns:a="http://schemas.openxmlformats.org/drawingml/2006/main" xmlns:r="http://schemas.openxmlformats.org/officeDocument/2006/relationships" xmlns:p="http://schemas.openxmlformats.org/presentationml/2006/main">
+  <p:cSld>
+    <p:spTree>
+      <p:nvGrpSpPr>
+        <p:cNvPr id="1" name=""/>
+        <p:cNvGrpSpPr/>
+        <p:nvPr/>
+      </p:nvGrpSpPr>
+      <p:grpSpPr>
+        <a:xfrm>
+          <a:off x="0" y="0"/>
+          <a:ext cx="0" cy="0"/>
+          <a:chOff x="0" y="0"/>
+          <a:chExt cx="0" cy="0"/>
+        </a:xfrm>
+      </p:grpSpPr>
+      <p:sp>
+        <p:nvSpPr>
+          <p:cNvPr id="2" name="Slide Image Placeholder 1"/>
+          <p:cNvSpPr>
+            <a:spLocks noGrp="1" noRot="1" noChangeAspect="1"/>
+          </p:cNvSpPr>
+          <p:nvPr>
+            <p:ph type="sldImg"/>
+          </p:nvPr>
+        </p:nvSpPr>
+        <p:spPr/>
+      </p:sp>
+      <p:sp>
+        <p:nvSpPr>
+          <p:cNvPr id="3" name="Notes Placeholder 2"/>
+          <p:cNvSpPr>
+            <a:spLocks noGrp="1"/>
+          </p:cNvSpPr>
+          <p:nvPr>
+            <p:ph type="body" idx="1"/>
+          </p:nvPr>
+        </p:nvSpPr>
+        <p:spPr/>
+        <p:txBody>
+          <a:bodyPr/>
+          <a:lstStyle/>
+          <a:p>
+            <a:pPr lvl="0" indent="0" marL="0">
+              <a:buNone/>
+            </a:pPr>
+            <a:r>
+              <a:rPr/>
+              <a:t>Our agenda is to develop a primary prevention technique based on exterior housing observations as well as neighborhood level social determinants of health. The goal will be to develop a data-driven, housing-based index that Lead Hazard Control programs can use to select the homes most in need of lead-based hazard remediation.</a:t>
+            </a:r>
+          </a:p>
+          <a:p>
+            <a:pPr lvl="0" indent="0" marL="0">
+              <a:buNone/>
+            </a:pPr>
+          </a:p>
+          <a:p>
+            <a:pPr lvl="0" indent="0" marL="0">
+              <a:buNone/>
+            </a:pPr>
+            <a:r>
+              <a:rPr/>
+              <a:t>The exterior based housing survey was developed by the Center for Economic Information and used in many Kansas City Missouri and Kansas City Kansas neighborhoods over the past two decades. It can be conducted by graduate students after a carefully established training program. The individual items in the survey, such as roofing condition are easily observed at the street level and can be done quickly and accurately. Our team has built extensive quality control procedures into the survey. It can be done quickly and cheaply. Our team has collected data on over 260 thousand houses over a 14 year period.</a:t>
+            </a:r>
+          </a:p>
+        </p:txBody>
+      </p:sp>
+      <p:sp>
+        <p:nvSpPr>
+          <p:cNvPr id="4" name="Slide Number Placeholder 3"/>
+          <p:cNvSpPr>
+            <a:spLocks noGrp="1"/>
+          </p:cNvSpPr>
+          <p:nvPr>
+            <p:ph type="sldNum" sz="quarter" idx="10"/>
+          </p:nvPr>
+        </p:nvSpPr>
+        <p:spPr/>
+        <p:txBody>
+          <a:bodyPr/>
+          <a:lstStyle/>
+          <a:p>
+            <a:fld id="{18BDFEC3-8487-43E8-A154-7C12CBC1FFF2}" type="slidenum">
+              <a:rPr lang="en-US"/>
+              <a:t>18</a:t>
+            </a:fld>
+            <a:endParaRPr lang="en-US"/>
+          </a:p>
+        </p:txBody>
+      </p:sp>
+    </p:spTree>
+  </p:cSld>
+</p:notes>
+</file>
+
+<file path=ppt/notesSlides/notesSlide16.xml><?xml version="1.0" encoding="utf-8"?>
+<p:notes xmlns:a="http://schemas.openxmlformats.org/drawingml/2006/main" xmlns:r="http://schemas.openxmlformats.org/officeDocument/2006/relationships" xmlns:p="http://schemas.openxmlformats.org/presentationml/2006/main">
+  <p:cSld>
+    <p:spTree>
+      <p:nvGrpSpPr>
+        <p:cNvPr id="1" name=""/>
+        <p:cNvGrpSpPr/>
+        <p:nvPr/>
+      </p:nvGrpSpPr>
+      <p:grpSpPr>
+        <a:xfrm>
+          <a:off x="0" y="0"/>
+          <a:ext cx="0" cy="0"/>
+          <a:chOff x="0" y="0"/>
+          <a:chExt cx="0" cy="0"/>
+        </a:xfrm>
+      </p:grpSpPr>
+      <p:sp>
+        <p:nvSpPr>
+          <p:cNvPr id="2" name="Slide Image Placeholder 1"/>
+          <p:cNvSpPr>
+            <a:spLocks noGrp="1" noRot="1" noChangeAspect="1"/>
+          </p:cNvSpPr>
+          <p:nvPr>
+            <p:ph type="sldImg"/>
+          </p:nvPr>
+        </p:nvSpPr>
+        <p:spPr/>
+      </p:sp>
+      <p:sp>
+        <p:nvSpPr>
+          <p:cNvPr id="3" name="Notes Placeholder 2"/>
+          <p:cNvSpPr>
+            <a:spLocks noGrp="1"/>
+          </p:cNvSpPr>
+          <p:nvPr>
+            <p:ph type="body" idx="1"/>
+          </p:nvPr>
+        </p:nvSpPr>
+        <p:spPr/>
+        <p:txBody>
+          <a:bodyPr/>
+          <a:lstStyle/>
+          <a:p>
+            <a:pPr lvl="0" indent="0" marL="0">
+              <a:buNone/>
+            </a:pPr>
+            <a:r>
+              <a:rPr/>
               <a:t>we’re quite proud of the proposal that we put together and see three major strengths of this research.</a:t>
             </a:r>
           </a:p>
@@ -697,7 +1236,7 @@
           <a:p>
             <a:fld id="{18BDFEC3-8487-43E8-A154-7C12CBC1FFF2}" type="slidenum">
               <a:rPr lang="en-US"/>
-              <a:t>14</a:t>
+              <a:t>19</a:t>
             </a:fld>
             <a:endParaRPr lang="en-US"/>
           </a:p>
@@ -757,7 +1296,7 @@
             </a:pPr>
             <a:r>
               <a:rPr/>
-              <a:t>Here’s a map showing single family home ownership by neighborhood.</a:t>
+              <a:t>The Center for Economic Information was started in 1994 and has worked with neighborhoods and communities in the Kansas City metropolitan area to provide them with data from a variety sources, including the Bureau of the Census.</a:t>
             </a:r>
           </a:p>
         </p:txBody>
@@ -779,7 +1318,7 @@
           <a:p>
             <a:fld id="{18BDFEC3-8487-43E8-A154-7C12CBC1FFF2}" type="slidenum">
               <a:rPr lang="en-US"/>
-              <a:t>5</a:t>
+              <a:t>3</a:t>
             </a:fld>
             <a:endParaRPr lang="en-US"/>
           </a:p>
@@ -839,7 +1378,7 @@
             </a:pPr>
             <a:r>
               <a:rPr/>
-              <a:t>A major effort of CEI has been their development and validation of the neighborhood housing conditions survey (NHCS). This survey provides ratings for parcels: residential housing and other structures including vacant lots. The survey uses an five point ordinal rating of fifteen elements related to the quality of a housing unit. These address the structure of house itself (such as conditions of the roof, porch, and exterior paint), the grounds around the house (such as the lawn, litter, and open storage) and the infrastructure (such as the sidewalk, curbs, and street lights).</a:t>
+              <a:t>Here’s a map showing single family home ownership by neighborhood.</a:t>
             </a:r>
           </a:p>
         </p:txBody>
@@ -861,7 +1400,7 @@
           <a:p>
             <a:fld id="{18BDFEC3-8487-43E8-A154-7C12CBC1FFF2}" type="slidenum">
               <a:rPr lang="en-US"/>
-              <a:t>6</a:t>
+              <a:t>4</a:t>
             </a:fld>
             <a:endParaRPr lang="en-US"/>
           </a:p>
@@ -921,77 +1460,7 @@
             </a:pPr>
             <a:r>
               <a:rPr/>
-              <a:t>CEI researchers in teams of two. The driver went slowly down the street and the researcher riding shotgun entered data on each house along the street.</a:t>
-            </a:r>
-          </a:p>
-          <a:p>
-            <a:pPr lvl="0" indent="0" marL="0">
-              <a:buNone/>
-            </a:pPr>
-          </a:p>
-          <a:p>
-            <a:pPr lvl="0" indent="0" marL="0">
-              <a:buNone/>
-            </a:pPr>
-            <a:r>
-              <a:rPr/>
-              <a:t>Because this data collection involved observations in a public setting, the IRB quickly determined that this study was exempt.</a:t>
-            </a:r>
-          </a:p>
-          <a:p>
-            <a:pPr lvl="0" indent="0" marL="0">
-              <a:buNone/>
-            </a:pPr>
-          </a:p>
-          <a:p>
-            <a:pPr lvl="0" indent="0" marL="0">
-              <a:buNone/>
-            </a:pPr>
-            <a:r>
-              <a:rPr/>
-              <a:t>It is relatively inexpensive, about $6 per house, when all the costs are accounted for.</a:t>
-            </a:r>
-          </a:p>
-          <a:p>
-            <a:pPr lvl="0" indent="0" marL="0">
-              <a:buNone/>
-            </a:pPr>
-          </a:p>
-          <a:p>
-            <a:pPr lvl="0" indent="0" marL="0">
-              <a:buNone/>
-            </a:pPr>
-            <a:r>
-              <a:rPr/>
-              <a:t>The survey provided a ton of data. Over a fifteen year period, CEI collected data on over 260,000 houses.</a:t>
-            </a:r>
-          </a:p>
-          <a:p>
-            <a:pPr lvl="0" indent="0" marL="0">
-              <a:buNone/>
-            </a:pPr>
-          </a:p>
-          <a:p>
-            <a:pPr lvl="0" indent="0" marL="0">
-              <a:buNone/>
-            </a:pPr>
-            <a:r>
-              <a:rPr/>
-              <a:t>The home in which you live affects many aspects of your social and economic well being. Can it affect your health as well. The answer is a strong YES!</a:t>
-            </a:r>
-          </a:p>
-          <a:p>
-            <a:pPr lvl="0" indent="0" marL="0">
-              <a:buNone/>
-            </a:pPr>
-          </a:p>
-          <a:p>
-            <a:pPr lvl="0" indent="0" marL="0">
-              <a:buNone/>
-            </a:pPr>
-            <a:r>
-              <a:rPr/>
-              <a:t>Much of my early work with CEI involved providing informal support to two students working at CEI. Both produced dissertations that addressed the influence of housing quality on health.</a:t>
+              <a:t>A major effort of CEI has been their development and validation of the neighborhood housing conditions survey (NHCS). This survey provides ratings for parcels: residential housing and other structures including vacant lots. The survey uses an five point ordinal rating of fifteen elements related to the quality of a housing unit. These address the structure of house itself (such as conditions of the roof, porch, and exterior paint), the grounds around the house (such as the lawn, litter, and open storage) and the infrastructure (such as the sidewalk, curbs, and street lights).</a:t>
             </a:r>
           </a:p>
         </p:txBody>
@@ -1013,7 +1482,7 @@
           <a:p>
             <a:fld id="{18BDFEC3-8487-43E8-A154-7C12CBC1FFF2}" type="slidenum">
               <a:rPr lang="en-US"/>
-              <a:t>7</a:t>
+              <a:t>5</a:t>
             </a:fld>
             <a:endParaRPr lang="en-US"/>
           </a:p>
@@ -1073,7 +1542,7 @@
             </a:pPr>
             <a:r>
               <a:rPr/>
-              <a:t>Natalie Kane, pictured here, wrote a dissertation examining how asthma can be exacerbated by poor housing conditions and other environmental variables such as proximity to point sources of pollution.</a:t>
+              <a:t>CEI researchers in teams of two. The driver went slowly down the street and the researcher riding shotgun entered data on each house along the street.</a:t>
             </a:r>
           </a:p>
           <a:p>
@@ -1087,7 +1556,7 @@
             </a:pPr>
             <a:r>
               <a:rPr/>
-              <a:t>She graduated from UMKC in 2020, worked as a post-doc at Children’s Mercy under the direction of Mark Hoffman, and is now working for My Sidewalk, an organization helping communities to access data useful for planning and lobbying efforts.</a:t>
+              <a:t>Because this data collection involved observations in a public setting, the IRB quickly determined that this study was exempt.</a:t>
             </a:r>
           </a:p>
           <a:p>
@@ -1101,7 +1570,49 @@
             </a:pPr>
             <a:r>
               <a:rPr/>
-              <a:t>I offered some informal advice about some Bayesian models she was using. She actually had done everything quite well, so my job was mostly explaining how to interpret these models and how to display her results properly.</a:t>
+              <a:t>It is relatively inexpensive, about $6 per house, when all the costs are accounted for.</a:t>
+            </a:r>
+          </a:p>
+          <a:p>
+            <a:pPr lvl="0" indent="0" marL="0">
+              <a:buNone/>
+            </a:pPr>
+          </a:p>
+          <a:p>
+            <a:pPr lvl="0" indent="0" marL="0">
+              <a:buNone/>
+            </a:pPr>
+            <a:r>
+              <a:rPr/>
+              <a:t>The survey provided a ton of data. Over a fifteen year period, CEI collected data on over 260,000 houses.</a:t>
+            </a:r>
+          </a:p>
+          <a:p>
+            <a:pPr lvl="0" indent="0" marL="0">
+              <a:buNone/>
+            </a:pPr>
+          </a:p>
+          <a:p>
+            <a:pPr lvl="0" indent="0" marL="0">
+              <a:buNone/>
+            </a:pPr>
+            <a:r>
+              <a:rPr/>
+              <a:t>The home in which you live affects many aspects of your social and economic well being. Can it affect your health as well. The answer is a strong YES!</a:t>
+            </a:r>
+          </a:p>
+          <a:p>
+            <a:pPr lvl="0" indent="0" marL="0">
+              <a:buNone/>
+            </a:pPr>
+          </a:p>
+          <a:p>
+            <a:pPr lvl="0" indent="0" marL="0">
+              <a:buNone/>
+            </a:pPr>
+            <a:r>
+              <a:rPr/>
+              <a:t>Much of my early work with CEI involved providing informal support to two students working at CEI. Both produced dissertations that addressed the influence of housing quality on health.</a:t>
             </a:r>
           </a:p>
         </p:txBody>
@@ -1123,7 +1634,7 @@
           <a:p>
             <a:fld id="{18BDFEC3-8487-43E8-A154-7C12CBC1FFF2}" type="slidenum">
               <a:rPr lang="en-US"/>
-              <a:t>8</a:t>
+              <a:t>6</a:t>
             </a:fld>
             <a:endParaRPr lang="en-US"/>
           </a:p>
@@ -1183,7 +1694,7 @@
             </a:pPr>
             <a:r>
               <a:rPr/>
-              <a:t>Neal Wilson, pictured here, wrote a dissertation looking at lead poisoning in children. He graduated in 2021 and is currently the Associate Director for CEI. He also teaches Introduction to Economics and Economic History at the California Institute of the Arts.</a:t>
+              <a:t>Natalie Kane, pictured here, wrote a dissertation examining how asthma can be exacerbated by poor housing conditions and other environmental variables such as proximity to point sources of pollution. The title of her dissertation is “An Interdisciplinary Approach to Health Disparities Research and Intervention: The Case of Childhood Asthma in Kansas City”</a:t>
             </a:r>
           </a:p>
           <a:p>
@@ -1197,7 +1708,21 @@
             </a:pPr>
             <a:r>
               <a:rPr/>
-              <a:t>Like Dr. Kane, Dr. Wilson used a Bayesian model in his research and I provided some informal advice.</a:t>
+              <a:t>She graduated from UMKC in 2020, worked as a post-doc at Children’s Mercy under the direction of Mark Hoffman, and is now working for My Sidewalk, an organization helping communities to access data useful for planning and lobbying efforts.</a:t>
+            </a:r>
+          </a:p>
+          <a:p>
+            <a:pPr lvl="0" indent="0" marL="0">
+              <a:buNone/>
+            </a:pPr>
+          </a:p>
+          <a:p>
+            <a:pPr lvl="0" indent="0" marL="0">
+              <a:buNone/>
+            </a:pPr>
+            <a:r>
+              <a:rPr/>
+              <a:t>I offered some informal advice about some Bayesian models she was using. She actually had done everything quite well, so my job was mostly explaining how to interpret these models and how to display her results properly.</a:t>
             </a:r>
           </a:p>
         </p:txBody>
@@ -1219,7 +1744,7 @@
           <a:p>
             <a:fld id="{18BDFEC3-8487-43E8-A154-7C12CBC1FFF2}" type="slidenum">
               <a:rPr lang="en-US"/>
-              <a:t>9</a:t>
+              <a:t>7</a:t>
             </a:fld>
             <a:endParaRPr lang="en-US"/>
           </a:p>
@@ -1279,7 +1804,7 @@
             </a:pPr>
             <a:r>
               <a:rPr/>
-              <a:t>The work we propose takes advantage of two key resources that already exist. The first is data from the Lead Safe Kansas City project. This program, funded by HUD, tests children for lead poisoning, home testing, and remediates if lead hazards are found. There is a massive amount of information from this project, 20 years worth of data and 18 thousand health encounters per year.</a:t>
+              <a:t>Neal Wilson, pictured here, wrote a dissertation looking at lead poisoning in children. The title of his dissertation is “Childhood Lead Poisoning and the Built Environment in Kansas City, Missouri, 2000-2013”. He graduated in 2021 and is currently the Associate Director for CEI. He also teaches Introduction to Economics and Economic History at the California Institute of the Arts.</a:t>
             </a:r>
           </a:p>
           <a:p>
@@ -1293,7 +1818,7 @@
             </a:pPr>
             <a:r>
               <a:rPr/>
-              <a:t>The second resource is an exterior based housing survey developed by the Center for Economic Information and used in many Kansas City Missouri and Kansas City Kansas neighborhoods over the past two decades. It can be conducted by graduate students after a carefully established training program. The individual items in the survey, such as roofing condition are easily observed at the street level and can be done quickly and accurately. Our team has built extensive quality control procedures into the survey. It can be done quickly and cheaply. Our team has collected data on over 260 thousand houses over a 14 year period.</a:t>
+              <a:t>Like Dr. Kane, Dr. Wilson used a Bayesian model in his research and I provided some informal advice.</a:t>
             </a:r>
           </a:p>
         </p:txBody>
@@ -1315,7 +1840,7 @@
           <a:p>
             <a:fld id="{18BDFEC3-8487-43E8-A154-7C12CBC1FFF2}" type="slidenum">
               <a:rPr lang="en-US"/>
-              <a:t>11</a:t>
+              <a:t>8</a:t>
             </a:fld>
             <a:endParaRPr lang="en-US"/>
           </a:p>
@@ -1375,7 +1900,7 @@
             </a:pPr>
             <a:r>
               <a:rPr/>
-              <a:t>We will describe the extent to which different interventions have made housing lead safe by HUD standards and how this leads to fewer lead poisoned children among those who move into a home after remediation activity.</a:t>
+              <a:t>In the summer of 2020, I worked on a grant with CEI and partners at Children’s Mercy and the Kansas City, Missouri Department of Health. We also worked on a second grant with the National Center for Healthy Housing, but that didn’t get funded, so I won’t discuss it further here.</a:t>
             </a:r>
           </a:p>
         </p:txBody>
@@ -1397,7 +1922,7 @@
           <a:p>
             <a:fld id="{18BDFEC3-8487-43E8-A154-7C12CBC1FFF2}" type="slidenum">
               <a:rPr lang="en-US"/>
-              <a:t>12</a:t>
+              <a:t>9</a:t>
             </a:fld>
             <a:endParaRPr lang="en-US"/>
           </a:p>
@@ -1457,7 +1982,21 @@
             </a:pPr>
             <a:r>
               <a:rPr/>
-              <a:t>Our agenda is to develop a primary prevention technique based on exterior housing observations as well as neighborhood level social determinants of health. The goal will be to develop a data-driven, housing-based index that Lead Hazard Control programs can use to select the homes most in need of lead-based hazard remediation.</a:t>
+              <a:t>Here’s the first page of the notice of funding availability (NOFA) for the grant we applied to. NOFA is an acronym for Housing and Urban Development. You’ll see other acronyms like RFA for NIH. Don’t bother trying to read the NOFA here. A Google search of FR-6400-N-15 would bring it up if you are curious.</a:t>
+            </a:r>
+          </a:p>
+          <a:p>
+            <a:pPr lvl="0" indent="0" marL="0">
+              <a:buNone/>
+            </a:pPr>
+          </a:p>
+          <a:p>
+            <a:pPr lvl="0" indent="0" marL="0">
+              <a:buNone/>
+            </a:pPr>
+            <a:r>
+              <a:rPr/>
+              <a:t>This NOFA is 68 pages long and everyone involved with writing this grant read through all 68 pages multiple times. I can’t stress enough how important it is to read the NOFA.</a:t>
             </a:r>
           </a:p>
         </p:txBody>
@@ -1479,7 +2018,7 @@
           <a:p>
             <a:fld id="{18BDFEC3-8487-43E8-A154-7C12CBC1FFF2}" type="slidenum">
               <a:rPr lang="en-US"/>
-              <a:t>13</a:t>
+              <a:t>10</a:t>
             </a:fld>
             <a:endParaRPr lang="en-US"/>
           </a:p>
@@ -4567,29 +5106,29 @@
             </a:pPr>
             <a:r>
               <a:rPr/>
-              <a:t>Housing and Urban Development</a:t>
+              <a:t>Notice of Funding Availability (FR-6400-N-15)</a:t>
             </a:r>
           </a:p>
         </p:txBody>
       </p:sp>
       <p:pic>
         <p:nvPicPr>
-          <p:cNvPr descr="../images/hud.jpg" id="0" name="Picture 1"/>
+          <p:cNvPr descr="../images/nofa.png" id="0" name="Picture 1"/>
           <p:cNvPicPr>
             <a:picLocks noGrp="1" noChangeAspect="1"/>
           </p:cNvPicPr>
           <p:nvPr/>
         </p:nvPicPr>
         <p:blipFill>
-          <a:blip r:embed="rId2"/>
+          <a:blip r:embed="rId3"/>
           <a:stretch>
             <a:fillRect/>
           </a:stretch>
         </p:blipFill>
         <p:spPr bwMode="auto">
           <a:xfrm>
-            <a:off x="1714500" y="1193800"/>
-            <a:ext cx="5715000" cy="3390900"/>
+            <a:off x="1447800" y="1193800"/>
+            <a:ext cx="6261100" cy="3390900"/>
           </a:xfrm>
           <a:prstGeom prst="rect">
             <a:avLst/>
@@ -4644,7 +5183,7 @@
             </a:pPr>
             <a:r>
               <a:rPr/>
-              <a:t>Leveraging existing resources</a:t>
+              <a:t>Grant proposal guidelines</a:t>
             </a:r>
           </a:p>
         </p:txBody>
@@ -4667,56 +5206,28 @@
             <a:pPr lvl="0"/>
             <a:r>
               <a:rPr/>
-              <a:t>Project Lead Safe Kansas City</a:t>
+              <a:t>Eligible applicants</a:t>
             </a:r>
           </a:p>
           <a:p>
             <a:pPr lvl="1"/>
             <a:r>
               <a:rPr/>
-              <a:t>20 years of data</a:t>
-            </a:r>
-          </a:p>
-          <a:p>
-            <a:pPr lvl="1"/>
-            <a:r>
-              <a:rPr/>
-              <a:t>18 thousand health encounters per year</a:t>
+              <a:t>Priority applicants</a:t>
             </a:r>
           </a:p>
           <a:p>
             <a:pPr lvl="0"/>
             <a:r>
               <a:rPr/>
-              <a:t>Exterior based housing survey</a:t>
-            </a:r>
-          </a:p>
-          <a:p>
-            <a:pPr lvl="1"/>
-            <a:r>
-              <a:rPr/>
-              <a:t>Quick, easy, cost effective ($6.50 per parcel)</a:t>
-            </a:r>
-          </a:p>
-          <a:p>
-            <a:pPr lvl="1"/>
-            <a:r>
-              <a:rPr/>
-              <a:t>Can be done at the street level</a:t>
-            </a:r>
-          </a:p>
-          <a:p>
-            <a:pPr lvl="1"/>
-            <a:r>
-              <a:rPr/>
-              <a:t>Extensive quality control procedures</a:t>
-            </a:r>
-          </a:p>
-          <a:p>
-            <a:pPr lvl="1"/>
-            <a:r>
-              <a:rPr/>
-              <a:t>Used routinely for over 260 thousand houses over 14 years.</a:t>
+              <a:t>Unfundable applications</a:t>
+            </a:r>
+          </a:p>
+          <a:p>
+            <a:pPr lvl="0"/>
+            <a:r>
+              <a:rPr/>
+              <a:t>Priority research topics</a:t>
             </a:r>
           </a:p>
         </p:txBody>
@@ -4763,7 +5274,7 @@
             </a:pPr>
             <a:r>
               <a:rPr/>
-              <a:t>Aim 1.</a:t>
+              <a:t>Pre-application</a:t>
             </a:r>
           </a:p>
         </p:txBody>
@@ -4786,21 +5297,49 @@
             <a:pPr lvl="0"/>
             <a:r>
               <a:rPr/>
-              <a:t>Quantify improvements made by KC Lead Safe</a:t>
+              <a:t>Cover sheet</a:t>
+            </a:r>
+          </a:p>
+          <a:p>
+            <a:pPr lvl="0"/>
+            <a:r>
+              <a:rPr/>
+              <a:t>200 word or less abstract</a:t>
+            </a:r>
+          </a:p>
+          <a:p>
+            <a:pPr lvl="0"/>
+            <a:r>
+              <a:rPr/>
+              <a:t>Five page narrative</a:t>
+            </a:r>
+          </a:p>
+          <a:p>
+            <a:pPr lvl="0"/>
+            <a:r>
+              <a:rPr/>
+              <a:t>Biosketches</a:t>
             </a:r>
           </a:p>
           <a:p>
             <a:pPr lvl="1"/>
             <a:r>
               <a:rPr/>
-              <a:t>Trends over time versus national trends</a:t>
+              <a:t>Up to three key personnel</a:t>
             </a:r>
           </a:p>
           <a:p>
             <a:pPr lvl="1"/>
             <a:r>
               <a:rPr/>
-              <a:t>Identify and evaluate children who move into remediated homes.</a:t>
+              <a:t>One page limit per biosketch</a:t>
+            </a:r>
+          </a:p>
+          <a:p>
+            <a:pPr lvl="0"/>
+            <a:r>
+              <a:rPr/>
+              <a:t>Estimated total funding</a:t>
             </a:r>
           </a:p>
         </p:txBody>
@@ -4847,7 +5386,7 @@
             </a:pPr>
             <a:r>
               <a:rPr/>
-              <a:t>Aim 2</a:t>
+              <a:t>Full application (25 page limit)</a:t>
             </a:r>
           </a:p>
         </p:txBody>
@@ -4870,28 +5409,77 @@
             <a:pPr lvl="0"/>
             <a:r>
               <a:rPr/>
-              <a:t>Validate use of exterior survey to identify high risk homes</a:t>
+              <a:t>Items not subject to 25 page limit</a:t>
             </a:r>
           </a:p>
           <a:p>
             <a:pPr lvl="1"/>
             <a:r>
               <a:rPr/>
-              <a:t>Conduct survey in 60 census tracts</a:t>
+              <a:t>Two page abstract</a:t>
             </a:r>
           </a:p>
           <a:p>
             <a:pPr lvl="1"/>
             <a:r>
               <a:rPr/>
-              <a:t>Select 50 houses with high score on survey</a:t>
+              <a:t>Resumes</a:t>
+            </a:r>
+          </a:p>
+          <a:p>
+            <a:pPr lvl="2"/>
+            <a:r>
+              <a:rPr/>
+              <a:t>Three page limit per resume</a:t>
             </a:r>
           </a:p>
           <a:p>
             <a:pPr lvl="1"/>
             <a:r>
               <a:rPr/>
-              <a:t>Compare to 50 neighboring control houses</a:t>
+              <a:t>Organizational chart</a:t>
+            </a:r>
+          </a:p>
+          <a:p>
+            <a:pPr lvl="1"/>
+            <a:r>
+              <a:rPr/>
+              <a:t>Letters of commitment</a:t>
+            </a:r>
+          </a:p>
+          <a:p>
+            <a:pPr lvl="1"/>
+            <a:r>
+              <a:rPr/>
+              <a:t>Bibliography</a:t>
+            </a:r>
+          </a:p>
+          <a:p>
+            <a:pPr lvl="1"/>
+            <a:r>
+              <a:rPr/>
+              <a:t>Additional materials/appendices</a:t>
+            </a:r>
+          </a:p>
+          <a:p>
+            <a:pPr lvl="2"/>
+            <a:r>
+              <a:rPr/>
+              <a:t>20 page limit</a:t>
+            </a:r>
+          </a:p>
+          <a:p>
+            <a:pPr lvl="0"/>
+            <a:r>
+              <a:rPr/>
+              <a:t>Budget using form HUD424CBW</a:t>
+            </a:r>
+          </a:p>
+          <a:p>
+            <a:pPr lvl="1"/>
+            <a:r>
+              <a:rPr/>
+              <a:t>Note required expenditures/disallowed expenditures</a:t>
             </a:r>
           </a:p>
         </p:txBody>
@@ -4902,6 +5490,482 @@
 </file>
 
 <file path=ppt/slides/slide14.xml><?xml version="1.0" encoding="utf-8"?>
+<p:sld xmlns:a="http://schemas.openxmlformats.org/drawingml/2006/main" xmlns:r="http://schemas.openxmlformats.org/officeDocument/2006/relationships" xmlns:p="http://schemas.openxmlformats.org/presentationml/2006/main">
+  <p:cSld>
+    <p:spTree>
+      <p:nvGrpSpPr>
+        <p:cNvPr id="1" name=""/>
+        <p:cNvGrpSpPr/>
+        <p:nvPr/>
+      </p:nvGrpSpPr>
+      <p:grpSpPr>
+        <a:xfrm>
+          <a:off x="0" y="0"/>
+          <a:ext cx="0" cy="0"/>
+          <a:chOff x="0" y="0"/>
+          <a:chExt cx="0" cy="0"/>
+        </a:xfrm>
+      </p:grpSpPr>
+      <p:sp>
+        <p:nvSpPr>
+          <p:cNvPr id="2" name="Title 1"/>
+          <p:cNvSpPr>
+            <a:spLocks noGrp="1"/>
+          </p:cNvSpPr>
+          <p:nvPr>
+            <p:ph type="title"/>
+          </p:nvPr>
+        </p:nvSpPr>
+        <p:spPr/>
+        <p:txBody>
+          <a:bodyPr/>
+          <a:lstStyle/>
+          <a:p>
+            <a:pPr lvl="0" indent="0" marL="0">
+              <a:buNone/>
+            </a:pPr>
+            <a:r>
+              <a:rPr/>
+              <a:t>Rating factors (100 points possible)</a:t>
+            </a:r>
+          </a:p>
+        </p:txBody>
+      </p:sp>
+      <p:sp>
+        <p:nvSpPr>
+          <p:cNvPr id="3" name="Content Placeholder 2"/>
+          <p:cNvSpPr>
+            <a:spLocks noGrp="1"/>
+          </p:cNvSpPr>
+          <p:nvPr>
+            <p:ph idx="1"/>
+          </p:nvPr>
+        </p:nvSpPr>
+        <p:spPr/>
+        <p:txBody>
+          <a:bodyPr/>
+          <a:lstStyle/>
+          <a:p>
+            <a:pPr lvl="0"/>
+            <a:r>
+              <a:rPr/>
+              <a:t>Capacity of the Applicant and Relevant Organizational Experience</a:t>
+            </a:r>
+          </a:p>
+          <a:p>
+            <a:pPr lvl="1"/>
+            <a:r>
+              <a:rPr/>
+              <a:t>Two elements (13 + 7 = 20 points)</a:t>
+            </a:r>
+          </a:p>
+          <a:p>
+            <a:pPr lvl="0"/>
+            <a:r>
+              <a:rPr/>
+              <a:t>Need for the research</a:t>
+            </a:r>
+          </a:p>
+          <a:p>
+            <a:pPr lvl="1"/>
+            <a:r>
+              <a:rPr/>
+              <a:t>Five elements (12 + 4 + 7 + 4 + 4 = 31 points)</a:t>
+            </a:r>
+          </a:p>
+          <a:p>
+            <a:pPr lvl="0"/>
+            <a:r>
+              <a:rPr/>
+              <a:t>Soundness of Approach</a:t>
+            </a:r>
+          </a:p>
+          <a:p>
+            <a:pPr lvl="1"/>
+            <a:r>
+              <a:rPr/>
+              <a:t>Four elements (20 + 5 + 1 + 5 = 31 points)</a:t>
+            </a:r>
+          </a:p>
+          <a:p>
+            <a:pPr lvl="0"/>
+            <a:r>
+              <a:rPr/>
+              <a:t>Leveraging Resources</a:t>
+            </a:r>
+          </a:p>
+          <a:p>
+            <a:pPr lvl="1"/>
+            <a:r>
+              <a:rPr/>
+              <a:t>One element (6 points)</a:t>
+            </a:r>
+          </a:p>
+          <a:p>
+            <a:pPr lvl="0"/>
+            <a:r>
+              <a:rPr/>
+              <a:t>Achieving Results and Project Management</a:t>
+            </a:r>
+          </a:p>
+          <a:p>
+            <a:pPr lvl="1"/>
+            <a:r>
+              <a:rPr/>
+              <a:t>Four elements (3 + 6 + 2 + 1 = 12 points)</a:t>
+            </a:r>
+          </a:p>
+        </p:txBody>
+      </p:sp>
+    </p:spTree>
+  </p:cSld>
+</p:sld>
+</file>
+
+<file path=ppt/slides/slide15.xml><?xml version="1.0" encoding="utf-8"?>
+<p:sld xmlns:a="http://schemas.openxmlformats.org/drawingml/2006/main" xmlns:r="http://schemas.openxmlformats.org/officeDocument/2006/relationships" xmlns:p="http://schemas.openxmlformats.org/presentationml/2006/main">
+  <p:cSld>
+    <p:spTree>
+      <p:nvGrpSpPr>
+        <p:cNvPr id="1" name=""/>
+        <p:cNvGrpSpPr/>
+        <p:nvPr/>
+      </p:nvGrpSpPr>
+      <p:grpSpPr>
+        <a:xfrm>
+          <a:off x="0" y="0"/>
+          <a:ext cx="0" cy="0"/>
+          <a:chOff x="0" y="0"/>
+          <a:chExt cx="0" cy="0"/>
+        </a:xfrm>
+      </p:grpSpPr>
+      <p:sp>
+        <p:nvSpPr>
+          <p:cNvPr id="2" name="Title 1"/>
+          <p:cNvSpPr>
+            <a:spLocks noGrp="1"/>
+          </p:cNvSpPr>
+          <p:nvPr>
+            <p:ph type="title"/>
+          </p:nvPr>
+        </p:nvSpPr>
+        <p:spPr/>
+        <p:txBody>
+          <a:bodyPr/>
+          <a:lstStyle/>
+          <a:p>
+            <a:pPr lvl="0" indent="0" marL="0">
+              <a:buNone/>
+            </a:pPr>
+            <a:r>
+              <a:rPr/>
+              <a:t>Examples of our focus (1/2)</a:t>
+            </a:r>
+          </a:p>
+        </p:txBody>
+      </p:sp>
+      <p:sp>
+        <p:nvSpPr>
+          <p:cNvPr id="3" name="Content Placeholder 2"/>
+          <p:cNvSpPr>
+            <a:spLocks noGrp="1"/>
+          </p:cNvSpPr>
+          <p:nvPr>
+            <p:ph idx="1"/>
+          </p:nvPr>
+        </p:nvSpPr>
+        <p:spPr/>
+        <p:txBody>
+          <a:bodyPr/>
+          <a:lstStyle/>
+          <a:p>
+            <a:pPr lvl="0"/>
+            <a:r>
+              <a:rPr/>
+              <a:t>Quality assurance plan (5 points)</a:t>
+            </a:r>
+          </a:p>
+          <a:p>
+            <a:pPr lvl="1"/>
+            <a:r>
+              <a:rPr/>
+              <a:t>You must describe the quality assurance mechanisms that will be integrated into your project design to ensure the validity and quality of the results. Applicants that receive awards will be required to submit a quality assurance plan to HUD. You should plan for this and include quality assurance activities in your study work plan.</a:t>
+            </a:r>
+          </a:p>
+        </p:txBody>
+      </p:sp>
+    </p:spTree>
+  </p:cSld>
+</p:sld>
+</file>
+
+<file path=ppt/slides/slide16.xml><?xml version="1.0" encoding="utf-8"?>
+<p:sld xmlns:a="http://schemas.openxmlformats.org/drawingml/2006/main" xmlns:r="http://schemas.openxmlformats.org/officeDocument/2006/relationships" xmlns:p="http://schemas.openxmlformats.org/presentationml/2006/main">
+  <p:cSld>
+    <p:spTree>
+      <p:nvGrpSpPr>
+        <p:cNvPr id="1" name=""/>
+        <p:cNvGrpSpPr/>
+        <p:nvPr/>
+      </p:nvGrpSpPr>
+      <p:grpSpPr>
+        <a:xfrm>
+          <a:off x="0" y="0"/>
+          <a:ext cx="0" cy="0"/>
+          <a:chOff x="0" y="0"/>
+          <a:chExt cx="0" cy="0"/>
+        </a:xfrm>
+      </p:grpSpPr>
+      <p:sp>
+        <p:nvSpPr>
+          <p:cNvPr id="2" name="Title 1"/>
+          <p:cNvSpPr>
+            <a:spLocks noGrp="1"/>
+          </p:cNvSpPr>
+          <p:nvPr>
+            <p:ph type="title"/>
+          </p:nvPr>
+        </p:nvSpPr>
+        <p:spPr/>
+        <p:txBody>
+          <a:bodyPr/>
+          <a:lstStyle/>
+          <a:p>
+            <a:pPr lvl="0" indent="0" marL="0">
+              <a:buNone/>
+            </a:pPr>
+            <a:r>
+              <a:rPr/>
+              <a:t>Examples of our focus (2/2)</a:t>
+            </a:r>
+          </a:p>
+        </p:txBody>
+      </p:sp>
+      <p:sp>
+        <p:nvSpPr>
+          <p:cNvPr id="3" name="Content Placeholder 2"/>
+          <p:cNvSpPr>
+            <a:spLocks noGrp="1"/>
+          </p:cNvSpPr>
+          <p:nvPr>
+            <p:ph idx="1"/>
+          </p:nvPr>
+        </p:nvSpPr>
+        <p:spPr/>
+        <p:txBody>
+          <a:bodyPr/>
+          <a:lstStyle/>
+          <a:p>
+            <a:pPr lvl="0"/>
+            <a:r>
+              <a:rPr/>
+              <a:t>Leveraging resources (6 points)</a:t>
+            </a:r>
+          </a:p>
+          <a:p>
+            <a:pPr lvl="1"/>
+            <a:r>
+              <a:rPr/>
+              <a:t>This factor addresses your ability to obtain other resources that can be combined with HUD’s funding to increase the effectiveness of the proposed study. To receive points, your proposal should demonstrate that the effectiveness of HUD’s Technical Studies grant funds is being increased by securing other resources or by structuring the study in a cost-effective manner, such as integrating the work into an existing study that will be concurrent with your proposed study.</a:t>
+            </a:r>
+          </a:p>
+        </p:txBody>
+      </p:sp>
+    </p:spTree>
+  </p:cSld>
+</p:sld>
+</file>
+
+<file path=ppt/slides/slide17.xml><?xml version="1.0" encoding="utf-8"?>
+<p:sld xmlns:a="http://schemas.openxmlformats.org/drawingml/2006/main" xmlns:r="http://schemas.openxmlformats.org/officeDocument/2006/relationships" xmlns:p="http://schemas.openxmlformats.org/presentationml/2006/main">
+  <p:cSld>
+    <p:spTree>
+      <p:nvGrpSpPr>
+        <p:cNvPr id="1" name=""/>
+        <p:cNvGrpSpPr/>
+        <p:nvPr/>
+      </p:nvGrpSpPr>
+      <p:grpSpPr>
+        <a:xfrm>
+          <a:off x="0" y="0"/>
+          <a:ext cx="0" cy="0"/>
+          <a:chOff x="0" y="0"/>
+          <a:chExt cx="0" cy="0"/>
+        </a:xfrm>
+      </p:grpSpPr>
+      <p:sp>
+        <p:nvSpPr>
+          <p:cNvPr id="2" name="Title 1"/>
+          <p:cNvSpPr>
+            <a:spLocks noGrp="1"/>
+          </p:cNvSpPr>
+          <p:nvPr>
+            <p:ph type="title"/>
+          </p:nvPr>
+        </p:nvSpPr>
+        <p:spPr/>
+        <p:txBody>
+          <a:bodyPr/>
+          <a:lstStyle/>
+          <a:p>
+            <a:pPr lvl="0" indent="0" marL="0">
+              <a:buNone/>
+            </a:pPr>
+            <a:r>
+              <a:rPr/>
+              <a:t>Break</a:t>
+            </a:r>
+          </a:p>
+        </p:txBody>
+      </p:sp>
+      <p:sp>
+        <p:nvSpPr>
+          <p:cNvPr id="3" name="Content Placeholder 2"/>
+          <p:cNvSpPr>
+            <a:spLocks noGrp="1"/>
+          </p:cNvSpPr>
+          <p:nvPr>
+            <p:ph idx="1"/>
+          </p:nvPr>
+        </p:nvSpPr>
+        <p:spPr/>
+        <p:txBody>
+          <a:bodyPr/>
+          <a:lstStyle/>
+          <a:p>
+            <a:pPr lvl="0"/>
+            <a:r>
+              <a:rPr/>
+              <a:t>Neal Wilson will talk now</a:t>
+            </a:r>
+          </a:p>
+          <a:p>
+            <a:pPr lvl="1"/>
+            <a:r>
+              <a:rPr/>
+              <a:t>Building a research team</a:t>
+            </a:r>
+          </a:p>
+          <a:p>
+            <a:pPr lvl="1"/>
+            <a:r>
+              <a:rPr/>
+              <a:t>Aim 1 of the grant</a:t>
+            </a:r>
+          </a:p>
+          <a:p>
+            <a:pPr lvl="0"/>
+            <a:r>
+              <a:rPr/>
+              <a:t>Then I will return</a:t>
+            </a:r>
+          </a:p>
+          <a:p>
+            <a:pPr lvl="1"/>
+            <a:r>
+              <a:rPr/>
+              <a:t>Aim 2 of the grant</a:t>
+            </a:r>
+          </a:p>
+        </p:txBody>
+      </p:sp>
+    </p:spTree>
+  </p:cSld>
+</p:sld>
+</file>
+
+<file path=ppt/slides/slide18.xml><?xml version="1.0" encoding="utf-8"?>
+<p:sld xmlns:a="http://schemas.openxmlformats.org/drawingml/2006/main" xmlns:r="http://schemas.openxmlformats.org/officeDocument/2006/relationships" xmlns:p="http://schemas.openxmlformats.org/presentationml/2006/main">
+  <p:cSld>
+    <p:spTree>
+      <p:nvGrpSpPr>
+        <p:cNvPr id="1" name=""/>
+        <p:cNvGrpSpPr/>
+        <p:nvPr/>
+      </p:nvGrpSpPr>
+      <p:grpSpPr>
+        <a:xfrm>
+          <a:off x="0" y="0"/>
+          <a:ext cx="0" cy="0"/>
+          <a:chOff x="0" y="0"/>
+          <a:chExt cx="0" cy="0"/>
+        </a:xfrm>
+      </p:grpSpPr>
+      <p:sp>
+        <p:nvSpPr>
+          <p:cNvPr id="2" name="Title 1"/>
+          <p:cNvSpPr>
+            <a:spLocks noGrp="1"/>
+          </p:cNvSpPr>
+          <p:nvPr>
+            <p:ph type="title"/>
+          </p:nvPr>
+        </p:nvSpPr>
+        <p:spPr/>
+        <p:txBody>
+          <a:bodyPr/>
+          <a:lstStyle/>
+          <a:p>
+            <a:pPr lvl="0" indent="0" marL="0">
+              <a:buNone/>
+            </a:pPr>
+            <a:r>
+              <a:rPr/>
+              <a:t>Aim 2</a:t>
+            </a:r>
+          </a:p>
+        </p:txBody>
+      </p:sp>
+      <p:sp>
+        <p:nvSpPr>
+          <p:cNvPr id="3" name="Content Placeholder 2"/>
+          <p:cNvSpPr>
+            <a:spLocks noGrp="1"/>
+          </p:cNvSpPr>
+          <p:nvPr>
+            <p:ph idx="1"/>
+          </p:nvPr>
+        </p:nvSpPr>
+        <p:spPr/>
+        <p:txBody>
+          <a:bodyPr/>
+          <a:lstStyle/>
+          <a:p>
+            <a:pPr lvl="0"/>
+            <a:r>
+              <a:rPr/>
+              <a:t>Validate use of exterior survey to identify high risk homes</a:t>
+            </a:r>
+          </a:p>
+          <a:p>
+            <a:pPr lvl="1"/>
+            <a:r>
+              <a:rPr/>
+              <a:t>Conduct survey in 60 census tracts</a:t>
+            </a:r>
+          </a:p>
+          <a:p>
+            <a:pPr lvl="1"/>
+            <a:r>
+              <a:rPr/>
+              <a:t>Select 50 houses with high score on survey</a:t>
+            </a:r>
+          </a:p>
+          <a:p>
+            <a:pPr lvl="1"/>
+            <a:r>
+              <a:rPr/>
+              <a:t>Compare to 50 neighboring control houses</a:t>
+            </a:r>
+          </a:p>
+        </p:txBody>
+      </p:sp>
+    </p:spTree>
+  </p:cSld>
+</p:sld>
+</file>
+
+<file path=ppt/slides/slide19.xml><?xml version="1.0" encoding="utf-8"?>
 <p:sld xmlns:a="http://schemas.openxmlformats.org/drawingml/2006/main" xmlns:r="http://schemas.openxmlformats.org/officeDocument/2006/relationships" xmlns:p="http://schemas.openxmlformats.org/presentationml/2006/main">
   <p:cSld>
     <p:spTree>
@@ -5120,7 +6184,7 @@
           <p:nvPr/>
         </p:nvPicPr>
         <p:blipFill>
-          <a:blip r:embed="rId2"/>
+          <a:blip r:embed="rId3"/>
           <a:stretch>
             <a:fillRect/>
           </a:stretch>
@@ -5165,53 +6229,6 @@
       </p:grpSpPr>
       <p:sp>
         <p:nvSpPr>
-          <p:cNvPr id="3" name="Content Placeholder 2"/>
-          <p:cNvSpPr>
-            <a:spLocks noGrp="1"/>
-          </p:cNvSpPr>
-          <p:nvPr>
-            <p:ph idx="1"/>
-          </p:nvPr>
-        </p:nvSpPr>
-        <p:spPr/>
-        <p:txBody>
-          <a:bodyPr/>
-          <a:lstStyle/>
-          <a:p>
-            <a:pPr lvl="0" indent="0" marL="0">
-              <a:buNone/>
-            </a:pPr>
-            <a:r>
-              <a:rPr/>
-              <a:t>The Center for Economic Information was started in 1994 and has worked with neighborhoods and communities in the Kansas City metropolitan area to provide them with data from a variety sources, including the Bureau of the Census.</a:t>
-            </a:r>
-          </a:p>
-        </p:txBody>
-      </p:sp>
-    </p:spTree>
-  </p:cSld>
-</p:sld>
-</file>
-
-<file path=ppt/slides/slide5.xml><?xml version="1.0" encoding="utf-8"?>
-<p:sld xmlns:a="http://schemas.openxmlformats.org/drawingml/2006/main" xmlns:r="http://schemas.openxmlformats.org/officeDocument/2006/relationships" xmlns:p="http://schemas.openxmlformats.org/presentationml/2006/main">
-  <p:cSld>
-    <p:spTree>
-      <p:nvGrpSpPr>
-        <p:cNvPr id="1" name=""/>
-        <p:cNvGrpSpPr/>
-        <p:nvPr/>
-      </p:nvGrpSpPr>
-      <p:grpSpPr>
-        <a:xfrm>
-          <a:off x="0" y="0"/>
-          <a:ext cx="0" cy="0"/>
-          <a:chOff x="0" y="0"/>
-          <a:chExt cx="0" cy="0"/>
-        </a:xfrm>
-      </p:grpSpPr>
-      <p:sp>
-        <p:nvSpPr>
           <p:cNvPr id="2" name="Title 1"/>
           <p:cNvSpPr>
             <a:spLocks noGrp="1"/>
@@ -5270,6 +6287,104 @@
 </p:sld>
 </file>
 
+<file path=ppt/slides/slide5.xml><?xml version="1.0" encoding="utf-8"?>
+<p:sld xmlns:a="http://schemas.openxmlformats.org/drawingml/2006/main" xmlns:r="http://schemas.openxmlformats.org/officeDocument/2006/relationships" xmlns:p="http://schemas.openxmlformats.org/presentationml/2006/main">
+  <p:cSld>
+    <p:spTree>
+      <p:nvGrpSpPr>
+        <p:cNvPr id="1" name=""/>
+        <p:cNvGrpSpPr/>
+        <p:nvPr/>
+      </p:nvGrpSpPr>
+      <p:grpSpPr>
+        <a:xfrm>
+          <a:off x="0" y="0"/>
+          <a:ext cx="0" cy="0"/>
+          <a:chOff x="0" y="0"/>
+          <a:chExt cx="0" cy="0"/>
+        </a:xfrm>
+      </p:grpSpPr>
+      <p:sp>
+        <p:nvSpPr>
+          <p:cNvPr id="2" name="Title 1"/>
+          <p:cNvSpPr>
+            <a:spLocks noGrp="1"/>
+          </p:cNvSpPr>
+          <p:nvPr>
+            <p:ph type="title"/>
+          </p:nvPr>
+        </p:nvSpPr>
+        <p:spPr/>
+        <p:txBody>
+          <a:bodyPr/>
+          <a:lstStyle/>
+          <a:p>
+            <a:pPr lvl="0" indent="0" marL="0">
+              <a:buNone/>
+            </a:pPr>
+            <a:r>
+              <a:rPr/>
+              <a:t>Neighborhood housing condition survey (1/2)</a:t>
+            </a:r>
+          </a:p>
+        </p:txBody>
+      </p:sp>
+      <p:sp>
+        <p:nvSpPr>
+          <p:cNvPr id="3" name="Content Placeholder 2"/>
+          <p:cNvSpPr>
+            <a:spLocks noGrp="1"/>
+          </p:cNvSpPr>
+          <p:nvPr>
+            <p:ph idx="1"/>
+          </p:nvPr>
+        </p:nvSpPr>
+        <p:spPr/>
+        <p:txBody>
+          <a:bodyPr/>
+          <a:lstStyle/>
+          <a:p>
+            <a:pPr lvl="0"/>
+            <a:r>
+              <a:rPr/>
+              <a:t>Fifteen ratings in three categories</a:t>
+            </a:r>
+          </a:p>
+          <a:p>
+            <a:pPr lvl="1"/>
+            <a:r>
+              <a:rPr/>
+              <a:t>Structure</a:t>
+            </a:r>
+          </a:p>
+          <a:p>
+            <a:pPr lvl="1"/>
+            <a:r>
+              <a:rPr/>
+              <a:t>Grounds</a:t>
+            </a:r>
+          </a:p>
+          <a:p>
+            <a:pPr lvl="1"/>
+            <a:r>
+              <a:rPr/>
+              <a:t>Infrastructure</a:t>
+            </a:r>
+          </a:p>
+          <a:p>
+            <a:pPr lvl="0"/>
+            <a:r>
+              <a:rPr/>
+              <a:t>Classification of the parcel</a:t>
+            </a:r>
+          </a:p>
+        </p:txBody>
+      </p:sp>
+    </p:spTree>
+  </p:cSld>
+</p:sld>
+</file>
+
 <file path=ppt/slides/slide6.xml><?xml version="1.0" encoding="utf-8"?>
 <p:sld xmlns:a="http://schemas.openxmlformats.org/drawingml/2006/main" xmlns:r="http://schemas.openxmlformats.org/officeDocument/2006/relationships" xmlns:p="http://schemas.openxmlformats.org/presentationml/2006/main">
   <p:cSld>
@@ -5307,7 +6422,7 @@
             </a:pPr>
             <a:r>
               <a:rPr/>
-              <a:t>Neighborhood housing condition survey (1/2)</a:t>
+              <a:t>Neighborhood housing condition survey (2/2)</a:t>
             </a:r>
           </a:p>
         </p:txBody>
@@ -5330,35 +6445,63 @@
             <a:pPr lvl="0"/>
             <a:r>
               <a:rPr/>
-              <a:t>Fifteen ratings in three categories</a:t>
+              <a:t>Evaluation done at the street level</a:t>
             </a:r>
           </a:p>
           <a:p>
             <a:pPr lvl="1"/>
             <a:r>
               <a:rPr/>
-              <a:t>Structure</a:t>
+              <a:t>IRB review: exempt</a:t>
+            </a:r>
+          </a:p>
+          <a:p>
+            <a:pPr lvl="2"/>
+            <a:r>
+              <a:rPr/>
+              <a:t>Observations in a public setting</a:t>
             </a:r>
           </a:p>
           <a:p>
             <a:pPr lvl="1"/>
             <a:r>
               <a:rPr/>
-              <a:t>Grounds</a:t>
+              <a:t>Relatively inexpensive</a:t>
             </a:r>
           </a:p>
           <a:p>
             <a:pPr lvl="1"/>
             <a:r>
               <a:rPr/>
-              <a:t>Infrastructure</a:t>
+              <a:t>Broad coverage across neighborhoods and years</a:t>
+            </a:r>
+          </a:p>
+          <a:p>
+            <a:pPr lvl="2"/>
+            <a:r>
+              <a:rPr/>
+              <a:t>22 surveys from 2000 through 2014</a:t>
+            </a:r>
+          </a:p>
+          <a:p>
+            <a:pPr lvl="2"/>
+            <a:r>
+              <a:rPr/>
+              <a:t>260,000 homes surveyed</a:t>
             </a:r>
           </a:p>
           <a:p>
             <a:pPr lvl="0"/>
             <a:r>
               <a:rPr/>
-              <a:t>Classification of the parcel</a:t>
+              <a:t>Does the home environment influence health?</a:t>
+            </a:r>
+          </a:p>
+          <a:p>
+            <a:pPr lvl="1"/>
+            <a:r>
+              <a:rPr/>
+              <a:t>YES!!!</a:t>
             </a:r>
           </a:p>
         </p:txBody>
@@ -5405,133 +6548,7 @@
             </a:pPr>
             <a:r>
               <a:rPr/>
-              <a:t>Neighborhood housing condition survey (2/2)</a:t>
-            </a:r>
-          </a:p>
-        </p:txBody>
-      </p:sp>
-      <p:sp>
-        <p:nvSpPr>
-          <p:cNvPr id="3" name="Content Placeholder 2"/>
-          <p:cNvSpPr>
-            <a:spLocks noGrp="1"/>
-          </p:cNvSpPr>
-          <p:nvPr>
-            <p:ph idx="1"/>
-          </p:nvPr>
-        </p:nvSpPr>
-        <p:spPr/>
-        <p:txBody>
-          <a:bodyPr/>
-          <a:lstStyle/>
-          <a:p>
-            <a:pPr lvl="0"/>
-            <a:r>
-              <a:rPr/>
-              <a:t>Evaluation done at the street level</a:t>
-            </a:r>
-          </a:p>
-          <a:p>
-            <a:pPr lvl="1"/>
-            <a:r>
-              <a:rPr/>
-              <a:t>IRB review: exempt</a:t>
-            </a:r>
-          </a:p>
-          <a:p>
-            <a:pPr lvl="2"/>
-            <a:r>
-              <a:rPr/>
-              <a:t>Observations in a public setting</a:t>
-            </a:r>
-          </a:p>
-          <a:p>
-            <a:pPr lvl="1"/>
-            <a:r>
-              <a:rPr/>
-              <a:t>Relatively inexpensive</a:t>
-            </a:r>
-          </a:p>
-          <a:p>
-            <a:pPr lvl="1"/>
-            <a:r>
-              <a:rPr/>
-              <a:t>Broad coverage across neighborhoods and years</a:t>
-            </a:r>
-          </a:p>
-          <a:p>
-            <a:pPr lvl="2"/>
-            <a:r>
-              <a:rPr/>
-              <a:t>22 surveys from 2000 through 2014</a:t>
-            </a:r>
-          </a:p>
-          <a:p>
-            <a:pPr lvl="2"/>
-            <a:r>
-              <a:rPr/>
-              <a:t>260,000 homes surveyed</a:t>
-            </a:r>
-          </a:p>
-          <a:p>
-            <a:pPr lvl="0"/>
-            <a:r>
-              <a:rPr/>
-              <a:t>Does the home environment influence health?</a:t>
-            </a:r>
-          </a:p>
-          <a:p>
-            <a:pPr lvl="1"/>
-            <a:r>
-              <a:rPr/>
-              <a:t>YES!!!</a:t>
-            </a:r>
-          </a:p>
-        </p:txBody>
-      </p:sp>
-    </p:spTree>
-  </p:cSld>
-</p:sld>
-</file>
-
-<file path=ppt/slides/slide8.xml><?xml version="1.0" encoding="utf-8"?>
-<p:sld xmlns:a="http://schemas.openxmlformats.org/drawingml/2006/main" xmlns:r="http://schemas.openxmlformats.org/officeDocument/2006/relationships" xmlns:p="http://schemas.openxmlformats.org/presentationml/2006/main">
-  <p:cSld>
-    <p:spTree>
-      <p:nvGrpSpPr>
-        <p:cNvPr id="1" name=""/>
-        <p:cNvGrpSpPr/>
-        <p:nvPr/>
-      </p:nvGrpSpPr>
-      <p:grpSpPr>
-        <a:xfrm>
-          <a:off x="0" y="0"/>
-          <a:ext cx="0" cy="0"/>
-          <a:chOff x="0" y="0"/>
-          <a:chExt cx="0" cy="0"/>
-        </a:xfrm>
-      </p:grpSpPr>
-      <p:sp>
-        <p:nvSpPr>
-          <p:cNvPr id="2" name="Title 1"/>
-          <p:cNvSpPr>
-            <a:spLocks noGrp="1"/>
-          </p:cNvSpPr>
-          <p:nvPr>
-            <p:ph type="title"/>
-          </p:nvPr>
-        </p:nvSpPr>
-        <p:spPr/>
-        <p:txBody>
-          <a:bodyPr/>
-          <a:lstStyle/>
-          <a:p>
-            <a:pPr lvl="0" indent="0" marL="0">
-              <a:buNone/>
-            </a:pPr>
-            <a:r>
-              <a:rPr/>
-              <a:t>“An Interdisciplinary Approach to Health Disparities Research and Intervention: The Case of Childhood Asthma in Kansas City”</a:t>
+              <a:t>Natalie Kane, Childhood asthma</a:t>
             </a:r>
           </a:p>
         </p:txBody>
@@ -5571,7 +6588,7 @@
 </p:sld>
 </file>
 
-<file path=ppt/slides/slide9.xml><?xml version="1.0" encoding="utf-8"?>
+<file path=ppt/slides/slide8.xml><?xml version="1.0" encoding="utf-8"?>
 <p:sld xmlns:a="http://schemas.openxmlformats.org/drawingml/2006/main" xmlns:r="http://schemas.openxmlformats.org/officeDocument/2006/relationships" xmlns:p="http://schemas.openxmlformats.org/presentationml/2006/main">
   <p:cSld>
     <p:spTree>
@@ -5631,6 +6648,83 @@
           <a:xfrm>
             <a:off x="3302000" y="1193800"/>
             <a:ext cx="2552700" cy="3390900"/>
+          </a:xfrm>
+          <a:prstGeom prst="rect">
+            <a:avLst/>
+          </a:prstGeom>
+          <a:noFill/>
+          <a:ln w="9525">
+            <a:noFill/>
+            <a:headEnd/>
+            <a:tailEnd/>
+          </a:ln>
+        </p:spPr>
+      </p:pic>
+    </p:spTree>
+  </p:cSld>
+</p:sld>
+</file>
+
+<file path=ppt/slides/slide9.xml><?xml version="1.0" encoding="utf-8"?>
+<p:sld xmlns:a="http://schemas.openxmlformats.org/drawingml/2006/main" xmlns:r="http://schemas.openxmlformats.org/officeDocument/2006/relationships" xmlns:p="http://schemas.openxmlformats.org/presentationml/2006/main">
+  <p:cSld>
+    <p:spTree>
+      <p:nvGrpSpPr>
+        <p:cNvPr id="1" name=""/>
+        <p:cNvGrpSpPr/>
+        <p:nvPr/>
+      </p:nvGrpSpPr>
+      <p:grpSpPr>
+        <a:xfrm>
+          <a:off x="0" y="0"/>
+          <a:ext cx="0" cy="0"/>
+          <a:chOff x="0" y="0"/>
+          <a:chExt cx="0" cy="0"/>
+        </a:xfrm>
+      </p:grpSpPr>
+      <p:sp>
+        <p:nvSpPr>
+          <p:cNvPr id="2" name="Title 1"/>
+          <p:cNvSpPr>
+            <a:spLocks noGrp="1"/>
+          </p:cNvSpPr>
+          <p:nvPr>
+            <p:ph type="title"/>
+          </p:nvPr>
+        </p:nvSpPr>
+        <p:spPr/>
+        <p:txBody>
+          <a:bodyPr/>
+          <a:lstStyle/>
+          <a:p>
+            <a:pPr lvl="0" indent="0" marL="0">
+              <a:buNone/>
+            </a:pPr>
+            <a:r>
+              <a:rPr/>
+              <a:t>Housing and Urban Development</a:t>
+            </a:r>
+          </a:p>
+        </p:txBody>
+      </p:sp>
+      <p:pic>
+        <p:nvPicPr>
+          <p:cNvPr descr="../images/hud.jpg" id="0" name="Picture 1"/>
+          <p:cNvPicPr>
+            <a:picLocks noGrp="1" noChangeAspect="1"/>
+          </p:cNvPicPr>
+          <p:nvPr/>
+        </p:nvPicPr>
+        <p:blipFill>
+          <a:blip r:embed="rId3"/>
+          <a:stretch>
+            <a:fillRect/>
+          </a:stretch>
+        </p:blipFill>
+        <p:spPr bwMode="auto">
+          <a:xfrm>
+            <a:off x="1714500" y="1193800"/>
+            <a:ext cx="5715000" cy="3390900"/>
           </a:xfrm>
           <a:prstGeom prst="rect">
             <a:avLst/>

</xml_diff>

<commit_message>
Minor formatting changes to dbhi-presentation.md
</commit_message>
<xml_diff>
--- a/kc-lead-impact/results/dbhi-presentation.pptx
+++ b/kc-lead-impact/results/dbhi-presentation.pptx
@@ -638,7 +638,21 @@
             </a:pPr>
             <a:r>
               <a:rPr/>
-              <a:t>Most calls for grants will also list things that they will not fund. The HUD grant would not fund</a:t>
+              <a:t>Most calls for grants will also list things that they will not fund. The HUD grant would not fund “applications that involve laboratory testing on living organisms with the exception of laboratory testing on animals that are residential pests (e.g., cockroaches, bed bugs, mice, etc.)”</a:t>
+            </a:r>
+          </a:p>
+          <a:p>
+            <a:pPr lvl="0" indent="0" marL="0">
+              <a:buNone/>
+            </a:pPr>
+          </a:p>
+          <a:p>
+            <a:pPr lvl="0" indent="0" marL="0">
+              <a:buNone/>
+            </a:pPr>
+            <a:r>
+              <a:rPr/>
+              <a:t>The NOFA mentions numerous priority topics. One of them relevant to our application is “Evaluation of the effectiveness of specific residential lead hazard control interventions.”</a:t>
             </a:r>
           </a:p>
         </p:txBody>
@@ -816,7 +830,7 @@
             </a:pPr>
             <a:r>
               <a:rPr/>
-              <a:t>HUD provides a rating system for grants with various points for each element. You want to make sure that you document anything that addresses any element, no matter how small. The National Center for Healthy Housing grant that we collaborated on–it missed being funded by a single point.</a:t>
+              <a:t>While the limit for the proposal is 25 pages, there are additional items outside this page limit. Most of these have their own limits.</a:t>
             </a:r>
           </a:p>
         </p:txBody>
@@ -838,7 +852,7 @@
           <a:p>
             <a:fld id="{18BDFEC3-8487-43E8-A154-7C12CBC1FFF2}" type="slidenum">
               <a:rPr lang="en-US"/>
-              <a:t>14</a:t>
+              <a:t>13</a:t>
             </a:fld>
             <a:endParaRPr lang="en-US"/>
           </a:p>
@@ -898,7 +912,7 @@
             </a:pPr>
             <a:r>
               <a:rPr/>
-              <a:t>We made sure to document a solid quality assurance plan. We even designated a quality assurance role for one of the invesigators.</a:t>
+              <a:t>HUD provides a rating system for grants with various points for each element. You want to make sure that you document anything that addresses any element, no matter how small. The National Center for Healthy Housing grant that we collaborated on–it missed being funded by a single point.</a:t>
             </a:r>
           </a:p>
         </p:txBody>
@@ -920,7 +934,7 @@
           <a:p>
             <a:fld id="{18BDFEC3-8487-43E8-A154-7C12CBC1FFF2}" type="slidenum">
               <a:rPr lang="en-US"/>
-              <a:t>15</a:t>
+              <a:t>14</a:t>
             </a:fld>
             <a:endParaRPr lang="en-US"/>
           </a:p>
@@ -980,7 +994,21 @@
             </a:pPr>
             <a:r>
               <a:rPr/>
-              <a:t>It was tricky to attach a dollar value to it, but we claimed the neighborhood housing conditions survey data and a resources that would be combined with additional data to increase the effectiveness of the proposal.</a:t>
+              <a:t>One of the elements under “Soundness of Approach” is “Quality assurance plan.” This is something that should be part of every research study, but when HUD specifically asked for it, you absolutely, positively must respond.</a:t>
+            </a:r>
+          </a:p>
+          <a:p>
+            <a:pPr lvl="0" indent="0" marL="0">
+              <a:buNone/>
+            </a:pPr>
+          </a:p>
+          <a:p>
+            <a:pPr lvl="0" indent="0" marL="0">
+              <a:buNone/>
+            </a:pPr>
+            <a:r>
+              <a:rPr/>
+              <a:t>We made sure to document a solid quality assurance plan. We even designated a quality assurance role for one of the invesigators.</a:t>
             </a:r>
           </a:p>
         </p:txBody>
@@ -1002,7 +1030,7 @@
           <a:p>
             <a:fld id="{18BDFEC3-8487-43E8-A154-7C12CBC1FFF2}" type="slidenum">
               <a:rPr lang="en-US"/>
-              <a:t>16</a:t>
+              <a:t>15</a:t>
             </a:fld>
             <a:endParaRPr lang="en-US"/>
           </a:p>
@@ -1062,21 +1090,21 @@
             </a:pPr>
             <a:r>
               <a:rPr/>
-              <a:t>Our agenda is to develop a primary prevention technique based on exterior housing observations as well as neighborhood level social determinants of health. The goal will be to develop a data-driven, housing-based index that Lead Hazard Control programs can use to select the homes most in need of lead-based hazard remediation.</a:t>
-            </a:r>
-          </a:p>
-          <a:p>
-            <a:pPr lvl="0" indent="0" marL="0">
-              <a:buNone/>
-            </a:pPr>
-          </a:p>
-          <a:p>
-            <a:pPr lvl="0" indent="0" marL="0">
-              <a:buNone/>
-            </a:pPr>
-            <a:r>
-              <a:rPr/>
-              <a:t>The exterior based housing survey was developed by the Center for Economic Information and used in many Kansas City Missouri and Kansas City Kansas neighborhoods over the past two decades. It can be conducted by graduate students after a carefully established training program. The individual items in the survey, such as roofing condition are easily observed at the street level and can be done quickly and accurately. Our team has built extensive quality control procedures into the survey. It can be done quickly and cheaply. Our team has collected data on over 260 thousand houses over a 14 year period.</a:t>
+              <a:t>The fourth rating factor was “Leveraging resources.” It is not too surprising that HUD would want to provide better ratings for those grants that could take advantage of other resources to supplement the research.</a:t>
+            </a:r>
+          </a:p>
+          <a:p>
+            <a:pPr lvl="0" indent="0" marL="0">
+              <a:buNone/>
+            </a:pPr>
+          </a:p>
+          <a:p>
+            <a:pPr lvl="0" indent="0" marL="0">
+              <a:buNone/>
+            </a:pPr>
+            <a:r>
+              <a:rPr/>
+              <a:t>It was tricky to attach a dollar value to it, but we claimed the neighborhood housing conditions survey data and a resources that would be combined with additional data to increase the effectiveness of the proposal.</a:t>
             </a:r>
           </a:p>
         </p:txBody>
@@ -1098,7 +1126,7 @@
           <a:p>
             <a:fld id="{18BDFEC3-8487-43E8-A154-7C12CBC1FFF2}" type="slidenum">
               <a:rPr lang="en-US"/>
-              <a:t>18</a:t>
+              <a:t>16</a:t>
             </a:fld>
             <a:endParaRPr lang="en-US"/>
           </a:p>
@@ -1158,6 +1186,102 @@
             </a:pPr>
             <a:r>
               <a:rPr/>
+              <a:t>Our agenda is to develop a primary prevention technique based on exterior housing observations as well as neighborhood level social determinants of health. The goal will be to develop a data-driven, housing-based index that Lead Hazard Control programs can use to select the homes most in need of lead-based hazard remediation.</a:t>
+            </a:r>
+          </a:p>
+          <a:p>
+            <a:pPr lvl="0" indent="0" marL="0">
+              <a:buNone/>
+            </a:pPr>
+          </a:p>
+          <a:p>
+            <a:pPr lvl="0" indent="0" marL="0">
+              <a:buNone/>
+            </a:pPr>
+            <a:r>
+              <a:rPr/>
+              <a:t>The exterior based housing survey was developed by the Center for Economic Information and used in many Kansas City Missouri and Kansas City Kansas neighborhoods over the past two decades. It can be conducted by graduate students after a carefully established training program. The individual items in the survey, such as roofing condition are easily observed at the street level and can be done quickly and accurately. Our team has built extensive quality control procedures into the survey. It can be done quickly and cheaply. Our team has collected data on over 260 thousand houses over a 14 year period.</a:t>
+            </a:r>
+          </a:p>
+        </p:txBody>
+      </p:sp>
+      <p:sp>
+        <p:nvSpPr>
+          <p:cNvPr id="4" name="Slide Number Placeholder 3"/>
+          <p:cNvSpPr>
+            <a:spLocks noGrp="1"/>
+          </p:cNvSpPr>
+          <p:nvPr>
+            <p:ph type="sldNum" sz="quarter" idx="10"/>
+          </p:nvPr>
+        </p:nvSpPr>
+        <p:spPr/>
+        <p:txBody>
+          <a:bodyPr/>
+          <a:lstStyle/>
+          <a:p>
+            <a:fld id="{18BDFEC3-8487-43E8-A154-7C12CBC1FFF2}" type="slidenum">
+              <a:rPr lang="en-US"/>
+              <a:t>18</a:t>
+            </a:fld>
+            <a:endParaRPr lang="en-US"/>
+          </a:p>
+        </p:txBody>
+      </p:sp>
+    </p:spTree>
+  </p:cSld>
+</p:notes>
+</file>
+
+<file path=ppt/notesSlides/notesSlide17.xml><?xml version="1.0" encoding="utf-8"?>
+<p:notes xmlns:a="http://schemas.openxmlformats.org/drawingml/2006/main" xmlns:r="http://schemas.openxmlformats.org/officeDocument/2006/relationships" xmlns:p="http://schemas.openxmlformats.org/presentationml/2006/main">
+  <p:cSld>
+    <p:spTree>
+      <p:nvGrpSpPr>
+        <p:cNvPr id="1" name=""/>
+        <p:cNvGrpSpPr/>
+        <p:nvPr/>
+      </p:nvGrpSpPr>
+      <p:grpSpPr>
+        <a:xfrm>
+          <a:off x="0" y="0"/>
+          <a:ext cx="0" cy="0"/>
+          <a:chOff x="0" y="0"/>
+          <a:chExt cx="0" cy="0"/>
+        </a:xfrm>
+      </p:grpSpPr>
+      <p:sp>
+        <p:nvSpPr>
+          <p:cNvPr id="2" name="Slide Image Placeholder 1"/>
+          <p:cNvSpPr>
+            <a:spLocks noGrp="1" noRot="1" noChangeAspect="1"/>
+          </p:cNvSpPr>
+          <p:nvPr>
+            <p:ph type="sldImg"/>
+          </p:nvPr>
+        </p:nvSpPr>
+        <p:spPr/>
+      </p:sp>
+      <p:sp>
+        <p:nvSpPr>
+          <p:cNvPr id="3" name="Notes Placeholder 2"/>
+          <p:cNvSpPr>
+            <a:spLocks noGrp="1"/>
+          </p:cNvSpPr>
+          <p:nvPr>
+            <p:ph type="body" idx="1"/>
+          </p:nvPr>
+        </p:nvSpPr>
+        <p:spPr/>
+        <p:txBody>
+          <a:bodyPr/>
+          <a:lstStyle/>
+          <a:p>
+            <a:pPr lvl="0" indent="0" marL="0">
+              <a:buNone/>
+            </a:pPr>
+            <a:r>
+              <a:rPr/>
               <a:t>we’re quite proud of the proposal that we put together and see three major strengths of this research.</a:t>
             </a:r>
           </a:p>
@@ -1982,7 +2106,49 @@
             </a:pPr>
             <a:r>
               <a:rPr/>
-              <a:t>Here’s the first page of the notice of funding availability (NOFA) for the grant we applied to. NOFA is an acronym for Housing and Urban Development. You’ll see other acronyms like RFA for NIH. Don’t bother trying to read the NOFA here. A Google search of FR-6400-N-15 would bring it up if you are curious.</a:t>
+              <a:t>Here’s the first page of the notice of funding availability (NOFA) for the grant we applied to. NOFA is an acronym for Housing and Urban Development.</a:t>
+            </a:r>
+          </a:p>
+          <a:p>
+            <a:pPr lvl="0" indent="0" marL="0">
+              <a:buNone/>
+            </a:pPr>
+          </a:p>
+          <a:p>
+            <a:pPr lvl="0" indent="0" marL="0">
+              <a:buNone/>
+            </a:pPr>
+            <a:r>
+              <a:rPr/>
+              <a:t>You’ll see other acronyms like RFA for NIH.</a:t>
+            </a:r>
+          </a:p>
+          <a:p>
+            <a:pPr lvl="0" indent="0" marL="0">
+              <a:buNone/>
+            </a:pPr>
+          </a:p>
+          <a:p>
+            <a:pPr lvl="0" indent="0" marL="0">
+              <a:buNone/>
+            </a:pPr>
+            <a:r>
+              <a:rPr/>
+              <a:t>Here’s a pop quiz. Put your answer in the chat box: What’s the difference between an FOA, PA, RFA, and RFP</a:t>
+            </a:r>
+          </a:p>
+          <a:p>
+            <a:pPr lvl="0" indent="0" marL="0">
+              <a:buNone/>
+            </a:pPr>
+          </a:p>
+          <a:p>
+            <a:pPr lvl="0" indent="0" marL="0">
+              <a:buNone/>
+            </a:pPr>
+            <a:r>
+              <a:rPr/>
+              <a:t>Don’t bother trying to read the NOFA here on this screen. A Google search of FR-6400-N-15 would bring it up if you are curious.</a:t>
             </a:r>
           </a:p>
           <a:p>
@@ -1997,6 +2163,34 @@
             <a:r>
               <a:rPr/>
               <a:t>This NOFA is 68 pages long and everyone involved with writing this grant read through all 68 pages multiple times. I can’t stress enough how important it is to read the NOFA.</a:t>
+            </a:r>
+          </a:p>
+          <a:p>
+            <a:pPr lvl="0" indent="0" marL="0">
+              <a:buNone/>
+            </a:pPr>
+          </a:p>
+          <a:p>
+            <a:pPr lvl="0" indent="0" marL="0">
+              <a:buNone/>
+            </a:pPr>
+            <a:r>
+              <a:rPr/>
+              <a:t>In the first paragraph of the NOFA, HUD states that “Failure to respond accurately to any submission requirement could result in an incomplete or noncompetitive proposal.”</a:t>
+            </a:r>
+          </a:p>
+          <a:p>
+            <a:pPr lvl="0" indent="0" marL="0">
+              <a:buNone/>
+            </a:pPr>
+          </a:p>
+          <a:p>
+            <a:pPr lvl="0" indent="0" marL="0">
+              <a:buNone/>
+            </a:pPr>
+            <a:r>
+              <a:rPr/>
+              <a:t>Let’s take a quick look at a few of these submission requirements.</a:t>
             </a:r>
           </a:p>
         </p:txBody>
@@ -5386,7 +5580,7 @@
             </a:pPr>
             <a:r>
               <a:rPr/>
-              <a:t>Full application (25 page limit)</a:t>
+              <a:t>Full application</a:t>
             </a:r>
           </a:p>
         </p:txBody>
@@ -5409,77 +5603,56 @@
             <a:pPr lvl="0"/>
             <a:r>
               <a:rPr/>
-              <a:t>Items not subject to 25 page limit</a:t>
-            </a:r>
-          </a:p>
-          <a:p>
-            <a:pPr lvl="1"/>
-            <a:r>
-              <a:rPr/>
-              <a:t>Two page abstract</a:t>
-            </a:r>
-          </a:p>
-          <a:p>
-            <a:pPr lvl="1"/>
-            <a:r>
-              <a:rPr/>
-              <a:t>Resumes</a:t>
-            </a:r>
-          </a:p>
-          <a:p>
-            <a:pPr lvl="2"/>
-            <a:r>
-              <a:rPr/>
-              <a:t>Three page limit per resume</a:t>
-            </a:r>
-          </a:p>
-          <a:p>
-            <a:pPr lvl="1"/>
+              <a:t>Proposal (25 page limit)</a:t>
+            </a:r>
+          </a:p>
+          <a:p>
+            <a:pPr lvl="0"/>
+            <a:r>
+              <a:rPr/>
+              <a:t>Abstract, two pages</a:t>
+            </a:r>
+          </a:p>
+          <a:p>
+            <a:pPr lvl="0"/>
+            <a:r>
+              <a:rPr/>
+              <a:t>Resumes, three pages per resume</a:t>
+            </a:r>
+          </a:p>
+          <a:p>
+            <a:pPr lvl="0"/>
             <a:r>
               <a:rPr/>
               <a:t>Organizational chart</a:t>
             </a:r>
           </a:p>
           <a:p>
-            <a:pPr lvl="1"/>
+            <a:pPr lvl="0"/>
             <a:r>
               <a:rPr/>
               <a:t>Letters of commitment</a:t>
             </a:r>
           </a:p>
           <a:p>
-            <a:pPr lvl="1"/>
+            <a:pPr lvl="0"/>
             <a:r>
               <a:rPr/>
               <a:t>Bibliography</a:t>
             </a:r>
           </a:p>
           <a:p>
-            <a:pPr lvl="1"/>
-            <a:r>
-              <a:rPr/>
-              <a:t>Additional materials/appendices</a:t>
-            </a:r>
-          </a:p>
-          <a:p>
-            <a:pPr lvl="2"/>
-            <a:r>
-              <a:rPr/>
-              <a:t>20 page limit</a:t>
-            </a:r>
-          </a:p>
-          <a:p>
             <a:pPr lvl="0"/>
             <a:r>
               <a:rPr/>
+              <a:t>Additional materials/appendices, 20 page limit</a:t>
+            </a:r>
+          </a:p>
+          <a:p>
+            <a:pPr lvl="0"/>
+            <a:r>
+              <a:rPr/>
               <a:t>Budget using form HUD424CBW</a:t>
-            </a:r>
-          </a:p>
-          <a:p>
-            <a:pPr lvl="1"/>
-            <a:r>
-              <a:rPr/>
-              <a:t>Note required expenditures/disallowed expenditures</a:t>
             </a:r>
           </a:p>
         </p:txBody>
@@ -5549,70 +5722,35 @@
             <a:pPr lvl="0"/>
             <a:r>
               <a:rPr/>
-              <a:t>Capacity of the Applicant and Relevant Organizational Experience</a:t>
-            </a:r>
-          </a:p>
-          <a:p>
-            <a:pPr lvl="1"/>
-            <a:r>
-              <a:rPr/>
-              <a:t>Two elements (13 + 7 = 20 points)</a:t>
+              <a:t>Capacity of the Applicant and Relevant Organizational Experience: Two elements (13 + 7 = 20 points)</a:t>
             </a:r>
           </a:p>
           <a:p>
             <a:pPr lvl="0"/>
             <a:r>
               <a:rPr/>
-              <a:t>Need for the research</a:t>
-            </a:r>
-          </a:p>
-          <a:p>
-            <a:pPr lvl="1"/>
-            <a:r>
-              <a:rPr/>
-              <a:t>Five elements (12 + 4 + 7 + 4 + 4 = 31 points)</a:t>
+              <a:t>Need for the research: Five elements (12 + 4 + 7 + 4 + 4 = 31 points)</a:t>
             </a:r>
           </a:p>
           <a:p>
             <a:pPr lvl="0"/>
             <a:r>
               <a:rPr/>
-              <a:t>Soundness of Approach</a:t>
-            </a:r>
-          </a:p>
-          <a:p>
-            <a:pPr lvl="1"/>
-            <a:r>
-              <a:rPr/>
-              <a:t>Four elements (20 + 5 + 1 + 5 = 31 points)</a:t>
+              <a:t>Soundness of Approach: Four elements (20 + 5 + 1 + 5 = 31 points)</a:t>
             </a:r>
           </a:p>
           <a:p>
             <a:pPr lvl="0"/>
             <a:r>
               <a:rPr/>
-              <a:t>Leveraging Resources</a:t>
-            </a:r>
-          </a:p>
-          <a:p>
-            <a:pPr lvl="1"/>
-            <a:r>
-              <a:rPr/>
-              <a:t>One element (6 points)</a:t>
+              <a:t>Leveraging Resources: One element (6 points)</a:t>
             </a:r>
           </a:p>
           <a:p>
             <a:pPr lvl="0"/>
             <a:r>
               <a:rPr/>
-              <a:t>Achieving Results and Project Management</a:t>
-            </a:r>
-          </a:p>
-          <a:p>
-            <a:pPr lvl="1"/>
-            <a:r>
-              <a:rPr/>
-              <a:t>Four elements (3 + 6 + 2 + 1 = 12 points)</a:t>
+              <a:t>Achieving Results and Project Management: Four elements (3 + 6 + 2 + 1 = 12 points)</a:t>
             </a:r>
           </a:p>
         </p:txBody>
@@ -6548,7 +6686,7 @@
             </a:pPr>
             <a:r>
               <a:rPr/>
-              <a:t>Natalie Kane, Childhood asthma</a:t>
+              <a:t>Natalie Kane, asthma</a:t>
             </a:r>
           </a:p>
         </p:txBody>
@@ -6625,7 +6763,7 @@
             </a:pPr>
             <a:r>
               <a:rPr/>
-              <a:t>“Childhood Lead Poisoning and the Built Environment in Kansas City, Missouri, 2000-2013”</a:t>
+              <a:t>Neal Wilson, lead poisoning</a:t>
             </a:r>
           </a:p>
         </p:txBody>

</xml_diff>